<commit_message>
update PowerPoint with dSWI4 data
</commit_message>
<xml_diff>
--- a/data/within-strain_ANOVA_results/p-value_summary_slide_2018-12-05.pptx
+++ b/data/within-strain_ANOVA_results/p-value_summary_slide_2018-12-05.pptx
@@ -4,6 +4,9 @@
   <p:sldMasterIdLst>
     <p:sldMasterId id="2147483648" r:id="rId1"/>
   </p:sldMasterIdLst>
+  <p:notesMasterIdLst>
+    <p:notesMasterId r:id="rId3"/>
+  </p:notesMasterIdLst>
   <p:sldIdLst>
     <p:sldId id="256" r:id="rId2"/>
   </p:sldIdLst>
@@ -121,6 +124,448 @@
     </p:ext>
   </p:extLst>
 </p:presentation>
+</file>
+
+<file path=ppt/notesMasters/notesMaster1.xml><?xml version="1.0" encoding="utf-8"?>
+<p:notesMaster xmlns:a="http://schemas.openxmlformats.org/drawingml/2006/main" xmlns:r="http://schemas.openxmlformats.org/officeDocument/2006/relationships" xmlns:p="http://schemas.openxmlformats.org/presentationml/2006/main">
+  <p:cSld>
+    <p:bg>
+      <p:bgRef idx="1001">
+        <a:schemeClr val="bg1"/>
+      </p:bgRef>
+    </p:bg>
+    <p:spTree>
+      <p:nvGrpSpPr>
+        <p:cNvPr id="1" name=""/>
+        <p:cNvGrpSpPr/>
+        <p:nvPr/>
+      </p:nvGrpSpPr>
+      <p:grpSpPr>
+        <a:xfrm>
+          <a:off x="0" y="0"/>
+          <a:ext cx="0" cy="0"/>
+          <a:chOff x="0" y="0"/>
+          <a:chExt cx="0" cy="0"/>
+        </a:xfrm>
+      </p:grpSpPr>
+      <p:sp>
+        <p:nvSpPr>
+          <p:cNvPr id="2" name="Header Placeholder 1"/>
+          <p:cNvSpPr>
+            <a:spLocks noGrp="1"/>
+          </p:cNvSpPr>
+          <p:nvPr>
+            <p:ph type="hdr" sz="quarter"/>
+          </p:nvPr>
+        </p:nvSpPr>
+        <p:spPr>
+          <a:xfrm>
+            <a:off x="0" y="0"/>
+            <a:ext cx="2971800" cy="458788"/>
+          </a:xfrm>
+          <a:prstGeom prst="rect">
+            <a:avLst/>
+          </a:prstGeom>
+        </p:spPr>
+        <p:txBody>
+          <a:bodyPr vert="horz" lIns="91440" tIns="45720" rIns="91440" bIns="45720" rtlCol="0"/>
+          <a:lstStyle>
+            <a:lvl1pPr algn="l">
+              <a:defRPr sz="1200"/>
+            </a:lvl1pPr>
+          </a:lstStyle>
+          <a:p>
+            <a:endParaRPr lang="en-US"/>
+          </a:p>
+        </p:txBody>
+      </p:sp>
+      <p:sp>
+        <p:nvSpPr>
+          <p:cNvPr id="3" name="Date Placeholder 2"/>
+          <p:cNvSpPr>
+            <a:spLocks noGrp="1"/>
+          </p:cNvSpPr>
+          <p:nvPr>
+            <p:ph type="dt" idx="1"/>
+          </p:nvPr>
+        </p:nvSpPr>
+        <p:spPr>
+          <a:xfrm>
+            <a:off x="3884613" y="0"/>
+            <a:ext cx="2971800" cy="458788"/>
+          </a:xfrm>
+          <a:prstGeom prst="rect">
+            <a:avLst/>
+          </a:prstGeom>
+        </p:spPr>
+        <p:txBody>
+          <a:bodyPr vert="horz" lIns="91440" tIns="45720" rIns="91440" bIns="45720" rtlCol="0"/>
+          <a:lstStyle>
+            <a:lvl1pPr algn="r">
+              <a:defRPr sz="1200"/>
+            </a:lvl1pPr>
+          </a:lstStyle>
+          <a:p>
+            <a:fld id="{AE5A99A3-8532-4FFA-ADDB-6E26F8EFCB6C}" type="datetimeFigureOut">
+              <a:rPr lang="en-US" smtClean="0"/>
+              <a:t>12/3/2018</a:t>
+            </a:fld>
+            <a:endParaRPr lang="en-US"/>
+          </a:p>
+        </p:txBody>
+      </p:sp>
+      <p:sp>
+        <p:nvSpPr>
+          <p:cNvPr id="4" name="Slide Image Placeholder 3"/>
+          <p:cNvSpPr>
+            <a:spLocks noGrp="1" noRot="1" noChangeAspect="1"/>
+          </p:cNvSpPr>
+          <p:nvPr>
+            <p:ph type="sldImg" idx="2"/>
+          </p:nvPr>
+        </p:nvSpPr>
+        <p:spPr>
+          <a:xfrm>
+            <a:off x="1371600" y="1143000"/>
+            <a:ext cx="4114800" cy="3086100"/>
+          </a:xfrm>
+          <a:prstGeom prst="rect">
+            <a:avLst/>
+          </a:prstGeom>
+          <a:noFill/>
+          <a:ln w="12700">
+            <a:solidFill>
+              <a:prstClr val="black"/>
+            </a:solidFill>
+          </a:ln>
+        </p:spPr>
+        <p:txBody>
+          <a:bodyPr vert="horz" lIns="91440" tIns="45720" rIns="91440" bIns="45720" rtlCol="0" anchor="ctr"/>
+          <a:lstStyle/>
+          <a:p>
+            <a:endParaRPr lang="en-US"/>
+          </a:p>
+        </p:txBody>
+      </p:sp>
+      <p:sp>
+        <p:nvSpPr>
+          <p:cNvPr id="5" name="Notes Placeholder 4"/>
+          <p:cNvSpPr>
+            <a:spLocks noGrp="1"/>
+          </p:cNvSpPr>
+          <p:nvPr>
+            <p:ph type="body" sz="quarter" idx="3"/>
+          </p:nvPr>
+        </p:nvSpPr>
+        <p:spPr>
+          <a:xfrm>
+            <a:off x="685800" y="4400550"/>
+            <a:ext cx="5486400" cy="3600450"/>
+          </a:xfrm>
+          <a:prstGeom prst="rect">
+            <a:avLst/>
+          </a:prstGeom>
+        </p:spPr>
+        <p:txBody>
+          <a:bodyPr vert="horz" lIns="91440" tIns="45720" rIns="91440" bIns="45720" rtlCol="0"/>
+          <a:lstStyle/>
+          <a:p>
+            <a:pPr lvl="0"/>
+            <a:r>
+              <a:rPr lang="en-US" smtClean="0"/>
+              <a:t>Click to edit Master text styles</a:t>
+            </a:r>
+          </a:p>
+          <a:p>
+            <a:pPr lvl="1"/>
+            <a:r>
+              <a:rPr lang="en-US" smtClean="0"/>
+              <a:t>Second level</a:t>
+            </a:r>
+          </a:p>
+          <a:p>
+            <a:pPr lvl="2"/>
+            <a:r>
+              <a:rPr lang="en-US" smtClean="0"/>
+              <a:t>Third level</a:t>
+            </a:r>
+          </a:p>
+          <a:p>
+            <a:pPr lvl="3"/>
+            <a:r>
+              <a:rPr lang="en-US" smtClean="0"/>
+              <a:t>Fourth level</a:t>
+            </a:r>
+          </a:p>
+          <a:p>
+            <a:pPr lvl="4"/>
+            <a:r>
+              <a:rPr lang="en-US" smtClean="0"/>
+              <a:t>Fifth level</a:t>
+            </a:r>
+            <a:endParaRPr lang="en-US"/>
+          </a:p>
+        </p:txBody>
+      </p:sp>
+      <p:sp>
+        <p:nvSpPr>
+          <p:cNvPr id="6" name="Footer Placeholder 5"/>
+          <p:cNvSpPr>
+            <a:spLocks noGrp="1"/>
+          </p:cNvSpPr>
+          <p:nvPr>
+            <p:ph type="ftr" sz="quarter" idx="4"/>
+          </p:nvPr>
+        </p:nvSpPr>
+        <p:spPr>
+          <a:xfrm>
+            <a:off x="0" y="8685213"/>
+            <a:ext cx="2971800" cy="458787"/>
+          </a:xfrm>
+          <a:prstGeom prst="rect">
+            <a:avLst/>
+          </a:prstGeom>
+        </p:spPr>
+        <p:txBody>
+          <a:bodyPr vert="horz" lIns="91440" tIns="45720" rIns="91440" bIns="45720" rtlCol="0" anchor="b"/>
+          <a:lstStyle>
+            <a:lvl1pPr algn="l">
+              <a:defRPr sz="1200"/>
+            </a:lvl1pPr>
+          </a:lstStyle>
+          <a:p>
+            <a:endParaRPr lang="en-US"/>
+          </a:p>
+        </p:txBody>
+      </p:sp>
+      <p:sp>
+        <p:nvSpPr>
+          <p:cNvPr id="7" name="Slide Number Placeholder 6"/>
+          <p:cNvSpPr>
+            <a:spLocks noGrp="1"/>
+          </p:cNvSpPr>
+          <p:nvPr>
+            <p:ph type="sldNum" sz="quarter" idx="5"/>
+          </p:nvPr>
+        </p:nvSpPr>
+        <p:spPr>
+          <a:xfrm>
+            <a:off x="3884613" y="8685213"/>
+            <a:ext cx="2971800" cy="458787"/>
+          </a:xfrm>
+          <a:prstGeom prst="rect">
+            <a:avLst/>
+          </a:prstGeom>
+        </p:spPr>
+        <p:txBody>
+          <a:bodyPr vert="horz" lIns="91440" tIns="45720" rIns="91440" bIns="45720" rtlCol="0" anchor="b"/>
+          <a:lstStyle>
+            <a:lvl1pPr algn="r">
+              <a:defRPr sz="1200"/>
+            </a:lvl1pPr>
+          </a:lstStyle>
+          <a:p>
+            <a:fld id="{D35259F9-EAE9-445D-A76E-D7BB204AEFE3}" type="slidenum">
+              <a:rPr lang="en-US" smtClean="0"/>
+              <a:t>‹#›</a:t>
+            </a:fld>
+            <a:endParaRPr lang="en-US"/>
+          </a:p>
+        </p:txBody>
+      </p:sp>
+    </p:spTree>
+    <p:extLst>
+      <p:ext uri="{BB962C8B-B14F-4D97-AF65-F5344CB8AC3E}">
+        <p14:creationId xmlns:p14="http://schemas.microsoft.com/office/powerpoint/2010/main" val="2986546786"/>
+      </p:ext>
+    </p:extLst>
+  </p:cSld>
+  <p:clrMap bg1="lt1" tx1="dk1" bg2="lt2" tx2="dk2" accent1="accent1" accent2="accent2" accent3="accent3" accent4="accent4" accent5="accent5" accent6="accent6" hlink="hlink" folHlink="folHlink"/>
+  <p:notesStyle>
+    <a:lvl1pPr marL="0" algn="l" defTabSz="914400" rtl="0" eaLnBrk="1" latinLnBrk="0" hangingPunct="1">
+      <a:defRPr sz="1200" kern="1200">
+        <a:solidFill>
+          <a:schemeClr val="tx1"/>
+        </a:solidFill>
+        <a:latin typeface="+mn-lt"/>
+        <a:ea typeface="+mn-ea"/>
+        <a:cs typeface="+mn-cs"/>
+      </a:defRPr>
+    </a:lvl1pPr>
+    <a:lvl2pPr marL="457200" algn="l" defTabSz="914400" rtl="0" eaLnBrk="1" latinLnBrk="0" hangingPunct="1">
+      <a:defRPr sz="1200" kern="1200">
+        <a:solidFill>
+          <a:schemeClr val="tx1"/>
+        </a:solidFill>
+        <a:latin typeface="+mn-lt"/>
+        <a:ea typeface="+mn-ea"/>
+        <a:cs typeface="+mn-cs"/>
+      </a:defRPr>
+    </a:lvl2pPr>
+    <a:lvl3pPr marL="914400" algn="l" defTabSz="914400" rtl="0" eaLnBrk="1" latinLnBrk="0" hangingPunct="1">
+      <a:defRPr sz="1200" kern="1200">
+        <a:solidFill>
+          <a:schemeClr val="tx1"/>
+        </a:solidFill>
+        <a:latin typeface="+mn-lt"/>
+        <a:ea typeface="+mn-ea"/>
+        <a:cs typeface="+mn-cs"/>
+      </a:defRPr>
+    </a:lvl3pPr>
+    <a:lvl4pPr marL="1371600" algn="l" defTabSz="914400" rtl="0" eaLnBrk="1" latinLnBrk="0" hangingPunct="1">
+      <a:defRPr sz="1200" kern="1200">
+        <a:solidFill>
+          <a:schemeClr val="tx1"/>
+        </a:solidFill>
+        <a:latin typeface="+mn-lt"/>
+        <a:ea typeface="+mn-ea"/>
+        <a:cs typeface="+mn-cs"/>
+      </a:defRPr>
+    </a:lvl4pPr>
+    <a:lvl5pPr marL="1828800" algn="l" defTabSz="914400" rtl="0" eaLnBrk="1" latinLnBrk="0" hangingPunct="1">
+      <a:defRPr sz="1200" kern="1200">
+        <a:solidFill>
+          <a:schemeClr val="tx1"/>
+        </a:solidFill>
+        <a:latin typeface="+mn-lt"/>
+        <a:ea typeface="+mn-ea"/>
+        <a:cs typeface="+mn-cs"/>
+      </a:defRPr>
+    </a:lvl5pPr>
+    <a:lvl6pPr marL="2286000" algn="l" defTabSz="914400" rtl="0" eaLnBrk="1" latinLnBrk="0" hangingPunct="1">
+      <a:defRPr sz="1200" kern="1200">
+        <a:solidFill>
+          <a:schemeClr val="tx1"/>
+        </a:solidFill>
+        <a:latin typeface="+mn-lt"/>
+        <a:ea typeface="+mn-ea"/>
+        <a:cs typeface="+mn-cs"/>
+      </a:defRPr>
+    </a:lvl6pPr>
+    <a:lvl7pPr marL="2743200" algn="l" defTabSz="914400" rtl="0" eaLnBrk="1" latinLnBrk="0" hangingPunct="1">
+      <a:defRPr sz="1200" kern="1200">
+        <a:solidFill>
+          <a:schemeClr val="tx1"/>
+        </a:solidFill>
+        <a:latin typeface="+mn-lt"/>
+        <a:ea typeface="+mn-ea"/>
+        <a:cs typeface="+mn-cs"/>
+      </a:defRPr>
+    </a:lvl7pPr>
+    <a:lvl8pPr marL="3200400" algn="l" defTabSz="914400" rtl="0" eaLnBrk="1" latinLnBrk="0" hangingPunct="1">
+      <a:defRPr sz="1200" kern="1200">
+        <a:solidFill>
+          <a:schemeClr val="tx1"/>
+        </a:solidFill>
+        <a:latin typeface="+mn-lt"/>
+        <a:ea typeface="+mn-ea"/>
+        <a:cs typeface="+mn-cs"/>
+      </a:defRPr>
+    </a:lvl8pPr>
+    <a:lvl9pPr marL="3657600" algn="l" defTabSz="914400" rtl="0" eaLnBrk="1" latinLnBrk="0" hangingPunct="1">
+      <a:defRPr sz="1200" kern="1200">
+        <a:solidFill>
+          <a:schemeClr val="tx1"/>
+        </a:solidFill>
+        <a:latin typeface="+mn-lt"/>
+        <a:ea typeface="+mn-ea"/>
+        <a:cs typeface="+mn-cs"/>
+      </a:defRPr>
+    </a:lvl9pPr>
+  </p:notesStyle>
+</p:notesMaster>
+</file>
+
+<file path=ppt/notesSlides/notesSlide1.xml><?xml version="1.0" encoding="utf-8"?>
+<p:notes xmlns:a="http://schemas.openxmlformats.org/drawingml/2006/main" xmlns:r="http://schemas.openxmlformats.org/officeDocument/2006/relationships" xmlns:p="http://schemas.openxmlformats.org/presentationml/2006/main">
+  <p:cSld>
+    <p:spTree>
+      <p:nvGrpSpPr>
+        <p:cNvPr id="1" name=""/>
+        <p:cNvGrpSpPr/>
+        <p:nvPr/>
+      </p:nvGrpSpPr>
+      <p:grpSpPr>
+        <a:xfrm>
+          <a:off x="0" y="0"/>
+          <a:ext cx="0" cy="0"/>
+          <a:chOff x="0" y="0"/>
+          <a:chExt cx="0" cy="0"/>
+        </a:xfrm>
+      </p:grpSpPr>
+      <p:sp>
+        <p:nvSpPr>
+          <p:cNvPr id="2" name="Slide Image Placeholder 1"/>
+          <p:cNvSpPr>
+            <a:spLocks noGrp="1" noRot="1" noChangeAspect="1"/>
+          </p:cNvSpPr>
+          <p:nvPr>
+            <p:ph type="sldImg"/>
+          </p:nvPr>
+        </p:nvSpPr>
+        <p:spPr/>
+      </p:sp>
+      <p:sp>
+        <p:nvSpPr>
+          <p:cNvPr id="3" name="Notes Placeholder 2"/>
+          <p:cNvSpPr>
+            <a:spLocks noGrp="1"/>
+          </p:cNvSpPr>
+          <p:nvPr>
+            <p:ph type="body" idx="1"/>
+          </p:nvPr>
+        </p:nvSpPr>
+        <p:spPr/>
+        <p:txBody>
+          <a:bodyPr/>
+          <a:lstStyle/>
+          <a:p>
+            <a:r>
+              <a:rPr lang="en-US" smtClean="0"/>
+              <a:t>Note that dSWI4</a:t>
+            </a:r>
+            <a:r>
+              <a:rPr lang="en-US" baseline="0" smtClean="0"/>
+              <a:t> ANOVA was done in Excel instead of in R, so the numbers may not be comparable.  The dSWI4 data has only 4 timepoints instead of 5 and the R script does not work with those data currently.</a:t>
+            </a:r>
+            <a:endParaRPr lang="en-US"/>
+          </a:p>
+        </p:txBody>
+      </p:sp>
+      <p:sp>
+        <p:nvSpPr>
+          <p:cNvPr id="4" name="Slide Number Placeholder 3"/>
+          <p:cNvSpPr>
+            <a:spLocks noGrp="1"/>
+          </p:cNvSpPr>
+          <p:nvPr>
+            <p:ph type="sldNum" sz="quarter" idx="10"/>
+          </p:nvPr>
+        </p:nvSpPr>
+        <p:spPr/>
+        <p:txBody>
+          <a:bodyPr/>
+          <a:lstStyle/>
+          <a:p>
+            <a:fld id="{D35259F9-EAE9-445D-A76E-D7BB204AEFE3}" type="slidenum">
+              <a:rPr lang="en-US" smtClean="0"/>
+              <a:t>1</a:t>
+            </a:fld>
+            <a:endParaRPr lang="en-US"/>
+          </a:p>
+        </p:txBody>
+      </p:sp>
+    </p:spTree>
+    <p:extLst>
+      <p:ext uri="{BB962C8B-B14F-4D97-AF65-F5344CB8AC3E}">
+        <p14:creationId xmlns:p14="http://schemas.microsoft.com/office/powerpoint/2010/main" val="3554621949"/>
+      </p:ext>
+    </p:extLst>
+  </p:cSld>
+  <p:clrMapOvr>
+    <a:masterClrMapping/>
+  </p:clrMapOvr>
+</p:notes>
 </file>
 
 <file path=ppt/slideLayouts/slideLayout1.xml><?xml version="1.0" encoding="utf-8"?>
@@ -3120,14 +3565,14 @@
           <p:nvPr>
             <p:extLst>
               <p:ext uri="{D42A27DB-BD31-4B8C-83A1-F6EECF244321}">
-                <p14:modId xmlns:p14="http://schemas.microsoft.com/office/powerpoint/2010/main" val="75278597"/>
+                <p14:modId xmlns:p14="http://schemas.microsoft.com/office/powerpoint/2010/main" val="4249977741"/>
               </p:ext>
             </p:extLst>
           </p:nvPr>
         </p:nvGraphicFramePr>
         <p:xfrm>
-          <a:off x="457200" y="228600"/>
-          <a:ext cx="8297777" cy="6414516"/>
+          <a:off x="1066800" y="990600"/>
+          <a:ext cx="6858000" cy="4302528"/>
         </p:xfrm>
         <a:graphic>
           <a:graphicData uri="http://schemas.openxmlformats.org/drawingml/2006/table">
@@ -3136,13 +3581,14 @@
                 <a:tableStyleId>{5C22544A-7EE6-4342-B048-85BDC9FD1C3A}</a:tableStyleId>
               </a:tblPr>
               <a:tblGrid>
-                <a:gridCol w="2743200"/>
-                <a:gridCol w="944700"/>
-                <a:gridCol w="921976"/>
-                <a:gridCol w="921975"/>
-                <a:gridCol w="921975"/>
-                <a:gridCol w="921976"/>
-                <a:gridCol w="921975"/>
+                <a:gridCol w="2040495"/>
+                <a:gridCol w="702703"/>
+                <a:gridCol w="685801"/>
+                <a:gridCol w="685800"/>
+                <a:gridCol w="685800"/>
+                <a:gridCol w="685801"/>
+                <a:gridCol w="685800"/>
+                <a:gridCol w="685800"/>
               </a:tblGrid>
               <a:tr h="534755">
                 <a:tc>
@@ -3162,7 +3608,7 @@
                         </a:spcAft>
                       </a:pPr>
                       <a:r>
-                        <a:rPr lang="en-US" sz="1800">
+                        <a:rPr lang="en-US" sz="1200">
                           <a:solidFill>
                             <a:schemeClr val="tx1"/>
                           </a:solidFill>
@@ -3173,7 +3619,7 @@
                         <a:t> </a:t>
                       </a:r>
                       <a:r>
-                        <a:rPr lang="en-US" sz="2100" i="1" smtClean="0">
+                        <a:rPr lang="en-US" sz="1200" i="1" smtClean="0">
                           <a:solidFill>
                             <a:schemeClr val="bg1"/>
                           </a:solidFill>
@@ -3184,7 +3630,7 @@
                         <a:t>ANOVA</a:t>
                       </a:r>
                       <a:r>
-                        <a:rPr lang="en-US" sz="2100" smtClean="0">
+                        <a:rPr lang="en-US" sz="1200" smtClean="0">
                           <a:solidFill>
                             <a:schemeClr val="bg1"/>
                           </a:solidFill>
@@ -3195,7 +3641,7 @@
                         <a:t>,</a:t>
                       </a:r>
                       <a:r>
-                        <a:rPr lang="en-US" sz="2100" baseline="0" smtClean="0">
+                        <a:rPr lang="en-US" sz="1200" baseline="0" smtClean="0">
                           <a:solidFill>
                             <a:schemeClr val="bg1"/>
                           </a:solidFill>
@@ -3206,7 +3652,7 @@
                         <a:t> </a:t>
                       </a:r>
                       <a:r>
-                        <a:rPr lang="en-US" sz="2100" smtClean="0">
+                        <a:rPr lang="en-US" sz="1200" smtClean="0">
                           <a:solidFill>
                             <a:schemeClr val="bg1"/>
                           </a:solidFill>
@@ -3216,7 +3662,7 @@
                         </a:rPr>
                         <a:t>number of genes (%)</a:t>
                       </a:r>
-                      <a:endParaRPr lang="en-US" sz="2100" dirty="0">
+                      <a:endParaRPr lang="en-US" sz="1200" dirty="0">
                         <a:solidFill>
                           <a:schemeClr val="bg1"/>
                         </a:solidFill>
@@ -3246,14 +3692,14 @@
                         </a:spcAft>
                       </a:pPr>
                       <a:r>
-                        <a:rPr lang="en-US" sz="1800" dirty="0">
+                        <a:rPr lang="en-US" sz="1200" dirty="0">
                           <a:effectLst/>
                           <a:latin typeface="Arial" panose="020B0604020202020204" pitchFamily="34" charset="0"/>
                           <a:cs typeface="Arial" panose="020B0604020202020204" pitchFamily="34" charset="0"/>
                         </a:rPr>
                         <a:t>WT</a:t>
                       </a:r>
-                      <a:endParaRPr lang="en-US" sz="1800" dirty="0">
+                      <a:endParaRPr lang="en-US" sz="1200" dirty="0">
                         <a:effectLst/>
                         <a:latin typeface="Arial" panose="020B0604020202020204" pitchFamily="34" charset="0"/>
                         <a:ea typeface="Calibri"/>
@@ -3280,7 +3726,7 @@
                         </a:spcAft>
                       </a:pPr>
                       <a:r>
-                        <a:rPr lang="en-US" sz="1800" i="1" smtClean="0">
+                        <a:rPr lang="en-US" sz="1200" i="1" smtClean="0">
                           <a:effectLst/>
                           <a:latin typeface="Symbol" panose="05050102010706020507" pitchFamily="18" charset="2"/>
                           <a:ea typeface="Calibri"/>
@@ -3289,7 +3735,7 @@
                         <a:t>D</a:t>
                       </a:r>
                       <a:r>
-                        <a:rPr lang="en-US" sz="1800" i="1" smtClean="0">
+                        <a:rPr lang="en-US" sz="1200" i="1" smtClean="0">
                           <a:effectLst/>
                           <a:latin typeface="Arial" panose="020B0604020202020204" pitchFamily="34" charset="0"/>
                           <a:ea typeface="Calibri"/>
@@ -3297,7 +3743,7 @@
                         </a:rPr>
                         <a:t>cin5</a:t>
                       </a:r>
-                      <a:endParaRPr lang="en-US" sz="1800" i="1" dirty="0">
+                      <a:endParaRPr lang="en-US" sz="1200" i="1" dirty="0">
                         <a:effectLst/>
                         <a:latin typeface="Arial" panose="020B0604020202020204" pitchFamily="34" charset="0"/>
                         <a:ea typeface="Calibri"/>
@@ -3324,7 +3770,7 @@
                         </a:spcAft>
                       </a:pPr>
                       <a:r>
-                        <a:rPr lang="en-US" sz="1800" i="1" smtClean="0">
+                        <a:rPr lang="en-US" sz="1200" i="1" smtClean="0">
                           <a:effectLst/>
                           <a:latin typeface="Symbol" panose="05050102010706020507" pitchFamily="18" charset="2"/>
                           <a:ea typeface="Calibri"/>
@@ -3333,7 +3779,7 @@
                         <a:t>D</a:t>
                       </a:r>
                       <a:r>
-                        <a:rPr lang="en-US" sz="1800" i="1" smtClean="0">
+                        <a:rPr lang="en-US" sz="1200" i="1" smtClean="0">
                           <a:effectLst/>
                           <a:latin typeface="Arial" panose="020B0604020202020204" pitchFamily="34" charset="0"/>
                           <a:ea typeface="Calibri"/>
@@ -3341,7 +3787,7 @@
                         </a:rPr>
                         <a:t>gln3</a:t>
                       </a:r>
-                      <a:endParaRPr lang="en-US" sz="1800" i="1" dirty="0">
+                      <a:endParaRPr lang="en-US" sz="1200" i="1" dirty="0">
                         <a:effectLst/>
                         <a:latin typeface="Arial" panose="020B0604020202020204" pitchFamily="34" charset="0"/>
                         <a:ea typeface="Calibri"/>
@@ -3368,7 +3814,7 @@
                         </a:spcAft>
                       </a:pPr>
                       <a:r>
-                        <a:rPr lang="en-US" sz="1800" i="1" smtClean="0">
+                        <a:rPr lang="en-US" sz="1200" i="1" smtClean="0">
                           <a:effectLst/>
                           <a:latin typeface="Symbol" panose="05050102010706020507" pitchFamily="18" charset="2"/>
                           <a:ea typeface="Calibri"/>
@@ -3377,7 +3823,7 @@
                         <a:t>D</a:t>
                       </a:r>
                       <a:r>
-                        <a:rPr lang="en-US" sz="1800" b="1" i="1" smtClean="0">
+                        <a:rPr lang="en-US" sz="1200" b="1" i="1" smtClean="0">
                           <a:effectLst/>
                           <a:latin typeface="Arial" panose="020B0604020202020204" pitchFamily="34" charset="0"/>
                           <a:ea typeface="Calibri"/>
@@ -3385,7 +3831,7 @@
                         </a:rPr>
                         <a:t>hap4</a:t>
                       </a:r>
-                      <a:endParaRPr lang="en-US" sz="1800" i="1" dirty="0">
+                      <a:endParaRPr lang="en-US" sz="1200" i="1" dirty="0">
                         <a:effectLst/>
                         <a:latin typeface="Arial" panose="020B0604020202020204" pitchFamily="34" charset="0"/>
                         <a:ea typeface="Calibri"/>
@@ -3412,7 +3858,7 @@
                         </a:spcAft>
                       </a:pPr>
                       <a:r>
-                        <a:rPr lang="en-US" sz="1800" i="1" smtClean="0">
+                        <a:rPr lang="en-US" sz="1200" i="1" smtClean="0">
                           <a:effectLst/>
                           <a:latin typeface="Symbol" panose="05050102010706020507" pitchFamily="18" charset="2"/>
                           <a:ea typeface="Calibri"/>
@@ -3421,7 +3867,7 @@
                         <a:t>D</a:t>
                       </a:r>
                       <a:r>
-                        <a:rPr lang="en-US" sz="1800" i="1" smtClean="0">
+                        <a:rPr lang="en-US" sz="1200" i="1" smtClean="0">
                           <a:effectLst/>
                           <a:latin typeface="Arial" panose="020B0604020202020204" pitchFamily="34" charset="0"/>
                           <a:ea typeface="Calibri"/>
@@ -3429,7 +3875,7 @@
                         </a:rPr>
                         <a:t>hmo1</a:t>
                       </a:r>
-                      <a:endParaRPr lang="en-US" sz="1800" i="1" dirty="0">
+                      <a:endParaRPr lang="en-US" sz="1200" i="1" dirty="0">
                         <a:effectLst/>
                         <a:latin typeface="Arial" panose="020B0604020202020204" pitchFamily="34" charset="0"/>
                         <a:ea typeface="Calibri"/>
@@ -3456,7 +3902,7 @@
                         </a:spcAft>
                       </a:pPr>
                       <a:r>
-                        <a:rPr lang="en-US" sz="1800" i="1" smtClean="0">
+                        <a:rPr lang="en-US" sz="1200" i="1" smtClean="0">
                           <a:effectLst/>
                           <a:latin typeface="Symbol" panose="05050102010706020507" pitchFamily="18" charset="2"/>
                           <a:ea typeface="Calibri"/>
@@ -3465,15 +3911,59 @@
                         <a:t>D</a:t>
                       </a:r>
                       <a:r>
-                        <a:rPr lang="en-US" sz="1800" i="1" smtClean="0">
+                        <a:rPr lang="en-US" sz="1200" i="1" smtClean="0">
                           <a:effectLst/>
                           <a:latin typeface="Arial" panose="020B0604020202020204" pitchFamily="34" charset="0"/>
                           <a:ea typeface="Calibri"/>
                           <a:cs typeface="Arial" panose="020B0604020202020204" pitchFamily="34" charset="0"/>
                         </a:rPr>
+                        <a:t>swi4</a:t>
+                      </a:r>
+                      <a:endParaRPr lang="en-US" sz="1200" i="1" dirty="0">
+                        <a:effectLst/>
+                        <a:latin typeface="Arial" panose="020B0604020202020204" pitchFamily="34" charset="0"/>
+                        <a:ea typeface="Calibri"/>
+                        <a:cs typeface="Arial" panose="020B0604020202020204" pitchFamily="34" charset="0"/>
+                      </a:endParaRPr>
+                    </a:p>
+                  </a:txBody>
+                  <a:tcPr marL="60538" marR="60538" marT="0" marB="0"/>
+                </a:tc>
+                <a:tc>
+                  <a:txBody>
+                    <a:bodyPr/>
+                    <a:lstStyle/>
+                    <a:p>
+                      <a:pPr marL="0" marR="0" algn="ctr">
+                        <a:lnSpc>
+                          <a:spcPct val="115000"/>
+                        </a:lnSpc>
+                        <a:spcBef>
+                          <a:spcPts val="0"/>
+                        </a:spcBef>
+                        <a:spcAft>
+                          <a:spcPts val="0"/>
+                        </a:spcAft>
+                      </a:pPr>
+                      <a:r>
+                        <a:rPr lang="en-US" sz="1200" i="1" smtClean="0">
+                          <a:effectLst/>
+                          <a:latin typeface="Symbol" panose="05050102010706020507" pitchFamily="18" charset="2"/>
+                          <a:ea typeface="Calibri"/>
+                          <a:cs typeface="Arial" panose="020B0604020202020204" pitchFamily="34" charset="0"/>
+                        </a:rPr>
+                        <a:t>D</a:t>
+                      </a:r>
+                      <a:r>
+                        <a:rPr lang="en-US" sz="1200" i="1" smtClean="0">
+                          <a:effectLst/>
+                          <a:latin typeface="Arial" panose="020B0604020202020204" pitchFamily="34" charset="0"/>
+                          <a:ea typeface="Calibri"/>
+                          <a:cs typeface="Arial" panose="020B0604020202020204" pitchFamily="34" charset="0"/>
+                        </a:rPr>
                         <a:t>zap1</a:t>
                       </a:r>
-                      <a:endParaRPr lang="en-US" sz="1800" i="1" dirty="0">
+                      <a:endParaRPr lang="en-US" sz="1200" i="1" dirty="0">
                         <a:effectLst/>
                         <a:latin typeface="Arial" panose="020B0604020202020204" pitchFamily="34" charset="0"/>
                         <a:ea typeface="Calibri"/>
@@ -3501,7 +3991,7 @@
                           <a:spcPts val="0"/>
                         </a:spcAft>
                       </a:pPr>
-                      <a:endParaRPr lang="en-US" sz="1800" smtClean="0">
+                      <a:endParaRPr lang="en-US" sz="1200" smtClean="0">
                         <a:effectLst/>
                         <a:latin typeface="Arial" panose="020B0604020202020204" pitchFamily="34" charset="0"/>
                         <a:cs typeface="Arial" panose="020B0604020202020204" pitchFamily="34" charset="0"/>
@@ -3520,7 +4010,7 @@
                         </a:spcAft>
                       </a:pPr>
                       <a:r>
-                        <a:rPr lang="en-US" sz="1800" smtClean="0">
+                        <a:rPr lang="en-US" sz="1200" smtClean="0">
                           <a:effectLst/>
                           <a:latin typeface="Arial" panose="020B0604020202020204" pitchFamily="34" charset="0"/>
                           <a:cs typeface="Arial" panose="020B0604020202020204" pitchFamily="34" charset="0"/>
@@ -3540,7 +4030,7 @@
                           <a:spcPts val="0"/>
                         </a:spcAft>
                       </a:pPr>
-                      <a:endParaRPr lang="en-US" sz="1800" dirty="0">
+                      <a:endParaRPr lang="en-US" sz="1200" dirty="0">
                         <a:effectLst/>
                         <a:latin typeface="Arial" panose="020B0604020202020204" pitchFamily="34" charset="0"/>
                         <a:ea typeface="Calibri"/>
@@ -3567,14 +4057,14 @@
                         </a:spcAft>
                       </a:pPr>
                       <a:r>
-                        <a:rPr lang="en-US" sz="1800" smtClean="0">
+                        <a:rPr lang="en-US" sz="1200" smtClean="0">
                           <a:effectLst/>
                           <a:latin typeface="Arial" panose="020B0604020202020204" pitchFamily="34" charset="0"/>
                           <a:cs typeface="Arial" panose="020B0604020202020204" pitchFamily="34" charset="0"/>
                         </a:rPr>
                         <a:t>2401 (38.8%)</a:t>
                       </a:r>
-                      <a:endParaRPr lang="en-US" sz="1800" dirty="0">
+                      <a:endParaRPr lang="en-US" sz="1200" dirty="0">
                         <a:effectLst/>
                         <a:latin typeface="Arial" panose="020B0604020202020204" pitchFamily="34" charset="0"/>
                         <a:ea typeface="Calibri"/>
@@ -3601,7 +4091,7 @@
                         </a:spcAft>
                       </a:pPr>
                       <a:r>
-                        <a:rPr lang="en-US" sz="1800" smtClean="0">
+                        <a:rPr lang="en-US" sz="1200" smtClean="0">
                           <a:effectLst/>
                           <a:latin typeface="Arial" panose="020B0604020202020204" pitchFamily="34" charset="0"/>
                           <a:ea typeface="Calibri"/>
@@ -3622,7 +4112,7 @@
                           <a:spcPts val="0"/>
                         </a:spcAft>
                       </a:pPr>
-                      <a:endParaRPr lang="en-US" sz="1800" dirty="0">
+                      <a:endParaRPr lang="en-US" sz="1200" dirty="0">
                         <a:effectLst/>
                         <a:latin typeface="Arial" panose="020B0604020202020204" pitchFamily="34" charset="0"/>
                         <a:ea typeface="Calibri"/>
@@ -3649,7 +4139,7 @@
                         </a:spcAft>
                       </a:pPr>
                       <a:r>
-                        <a:rPr lang="en-US" sz="1800" smtClean="0">
+                        <a:rPr lang="en-US" sz="1200" smtClean="0">
                           <a:effectLst/>
                           <a:latin typeface="Arial" panose="020B0604020202020204" pitchFamily="34" charset="0"/>
                           <a:ea typeface="Calibri"/>
@@ -3657,7 +4147,7 @@
                         </a:rPr>
                         <a:t>1908 (30.8%)</a:t>
                       </a:r>
-                      <a:endParaRPr lang="en-US" sz="1800" dirty="0">
+                      <a:endParaRPr lang="en-US" sz="1200" dirty="0">
                         <a:effectLst/>
                         <a:latin typeface="Arial" panose="020B0604020202020204" pitchFamily="34" charset="0"/>
                         <a:ea typeface="Calibri"/>
@@ -3684,14 +4174,14 @@
                         </a:spcAft>
                       </a:pPr>
                       <a:r>
-                        <a:rPr lang="en-US" sz="1800" smtClean="0">
+                        <a:rPr lang="en-US" sz="1200" smtClean="0">
                           <a:effectLst/>
                           <a:latin typeface="Arial" panose="020B0604020202020204" pitchFamily="34" charset="0"/>
                           <a:cs typeface="Arial" panose="020B0604020202020204" pitchFamily="34" charset="0"/>
                         </a:rPr>
                         <a:t>2382 (38.5%)</a:t>
                       </a:r>
-                      <a:endParaRPr lang="en-US" sz="1800" dirty="0">
+                      <a:endParaRPr lang="en-US" sz="1200" dirty="0">
                         <a:effectLst/>
                         <a:latin typeface="Arial" panose="020B0604020202020204" pitchFamily="34" charset="0"/>
                         <a:ea typeface="Calibri"/>
@@ -3718,7 +4208,7 @@
                         </a:spcAft>
                       </a:pPr>
                       <a:r>
-                        <a:rPr lang="en-US" sz="1800" smtClean="0">
+                        <a:rPr lang="en-US" sz="1200" smtClean="0">
                           <a:effectLst/>
                           <a:latin typeface="Arial" panose="020B0604020202020204" pitchFamily="34" charset="0"/>
                           <a:ea typeface="Calibri"/>
@@ -3726,7 +4216,7 @@
                         </a:rPr>
                         <a:t>895 (14.5%)</a:t>
                       </a:r>
-                      <a:endParaRPr lang="en-US" sz="1800" dirty="0">
+                      <a:endParaRPr lang="en-US" sz="1200" dirty="0">
                         <a:effectLst/>
                         <a:latin typeface="Arial" panose="020B0604020202020204" pitchFamily="34" charset="0"/>
                         <a:ea typeface="Calibri"/>
@@ -3753,7 +4243,36 @@
                         </a:spcAft>
                       </a:pPr>
                       <a:r>
-                        <a:rPr lang="en-US" sz="1800" smtClean="0">
+                        <a:rPr lang="en-US" sz="1200" smtClean="0">
+                          <a:effectLst/>
+                          <a:latin typeface="Arial" panose="020B0604020202020204" pitchFamily="34" charset="0"/>
+                          <a:ea typeface="Calibri"/>
+                          <a:cs typeface="Arial" panose="020B0604020202020204" pitchFamily="34" charset="0"/>
+                        </a:rPr>
+                        <a:t>2809 (45.1%)</a:t>
+                      </a:r>
+                    </a:p>
+                  </a:txBody>
+                  <a:tcPr marL="60538" marR="60538" marT="0" marB="0"/>
+                </a:tc>
+                <a:tc>
+                  <a:txBody>
+                    <a:bodyPr/>
+                    <a:lstStyle/>
+                    <a:p>
+                      <a:pPr marL="0" marR="0" algn="ctr">
+                        <a:lnSpc>
+                          <a:spcPct val="115000"/>
+                        </a:lnSpc>
+                        <a:spcBef>
+                          <a:spcPts val="0"/>
+                        </a:spcBef>
+                        <a:spcAft>
+                          <a:spcPts val="0"/>
+                        </a:spcAft>
+                      </a:pPr>
+                      <a:r>
+                        <a:rPr lang="en-US" sz="1200" smtClean="0">
                           <a:effectLst/>
                           <a:latin typeface="Arial" panose="020B0604020202020204" pitchFamily="34" charset="0"/>
                           <a:ea typeface="Calibri"/>
@@ -3789,7 +4308,7 @@
                         <a:tabLst/>
                         <a:defRPr/>
                       </a:pPr>
-                      <a:endParaRPr lang="en-US" sz="1800" smtClean="0">
+                      <a:endParaRPr lang="en-US" sz="1200" smtClean="0">
                         <a:effectLst/>
                         <a:latin typeface="Arial" panose="020B0604020202020204" pitchFamily="34" charset="0"/>
                         <a:cs typeface="Arial" panose="020B0604020202020204" pitchFamily="34" charset="0"/>
@@ -3814,7 +4333,7 @@
                         <a:defRPr/>
                       </a:pPr>
                       <a:r>
-                        <a:rPr lang="en-US" sz="1800" smtClean="0">
+                        <a:rPr lang="en-US" sz="1200" smtClean="0">
                           <a:effectLst/>
                           <a:latin typeface="Arial" panose="020B0604020202020204" pitchFamily="34" charset="0"/>
                           <a:cs typeface="Arial" panose="020B0604020202020204" pitchFamily="34" charset="0"/>
@@ -3822,14 +4341,14 @@
                         <a:t>p </a:t>
                       </a:r>
                       <a:r>
-                        <a:rPr lang="en-US" sz="1800" dirty="0" smtClean="0">
+                        <a:rPr lang="en-US" sz="1200" dirty="0" smtClean="0">
                           <a:effectLst/>
                           <a:latin typeface="Arial" panose="020B0604020202020204" pitchFamily="34" charset="0"/>
                           <a:cs typeface="Arial" panose="020B0604020202020204" pitchFamily="34" charset="0"/>
                         </a:rPr>
                         <a:t>&lt; 0.01</a:t>
                       </a:r>
-                      <a:endParaRPr lang="en-US" sz="1800" dirty="0" smtClean="0">
+                      <a:endParaRPr lang="en-US" sz="1200" dirty="0" smtClean="0">
                         <a:effectLst/>
                         <a:latin typeface="Arial" panose="020B0604020202020204" pitchFamily="34" charset="0"/>
                         <a:ea typeface="Calibri"/>
@@ -3848,7 +4367,7 @@
                           <a:spcPts val="0"/>
                         </a:spcAft>
                       </a:pPr>
-                      <a:endParaRPr lang="en-US" sz="1800" dirty="0">
+                      <a:endParaRPr lang="en-US" sz="1200" dirty="0">
                         <a:effectLst/>
                         <a:latin typeface="Arial" panose="020B0604020202020204" pitchFamily="34" charset="0"/>
                         <a:ea typeface="Calibri"/>
@@ -3881,14 +4400,14 @@
                         <a:defRPr/>
                       </a:pPr>
                       <a:r>
-                        <a:rPr lang="en-US" sz="1800" smtClean="0">
+                        <a:rPr lang="en-US" sz="1200" smtClean="0">
                           <a:effectLst/>
                           <a:latin typeface="Arial" panose="020B0604020202020204" pitchFamily="34" charset="0"/>
                           <a:cs typeface="Arial" panose="020B0604020202020204" pitchFamily="34" charset="0"/>
                         </a:rPr>
                         <a:t>1536 (24.8%)</a:t>
                       </a:r>
-                      <a:endParaRPr lang="en-US" sz="1800" dirty="0" smtClean="0">
+                      <a:endParaRPr lang="en-US" sz="1200" dirty="0" smtClean="0">
                         <a:effectLst/>
                         <a:latin typeface="Arial" panose="020B0604020202020204" pitchFamily="34" charset="0"/>
                         <a:ea typeface="Calibri"/>
@@ -3907,7 +4426,7 @@
                           <a:spcPts val="0"/>
                         </a:spcAft>
                       </a:pPr>
-                      <a:endParaRPr lang="en-US" sz="1800" dirty="0">
+                      <a:endParaRPr lang="en-US" sz="1200" dirty="0">
                         <a:effectLst/>
                         <a:latin typeface="Arial" panose="020B0604020202020204" pitchFamily="34" charset="0"/>
                         <a:ea typeface="Calibri"/>
@@ -3934,7 +4453,7 @@
                         </a:spcAft>
                       </a:pPr>
                       <a:r>
-                        <a:rPr lang="en-US" sz="1800" smtClean="0">
+                        <a:rPr lang="en-US" sz="1200" smtClean="0">
                           <a:effectLst/>
                           <a:latin typeface="Arial" panose="020B0604020202020204" pitchFamily="34" charset="0"/>
                           <a:ea typeface="Calibri"/>
@@ -3943,7 +4462,7 @@
                         <a:t>1230 (19.9</a:t>
                       </a:r>
                       <a:r>
-                        <a:rPr lang="en-US" sz="1800" baseline="0" smtClean="0">
+                        <a:rPr lang="en-US" sz="1200" baseline="0" smtClean="0">
                           <a:effectLst/>
                           <a:latin typeface="Arial" panose="020B0604020202020204" pitchFamily="34" charset="0"/>
                           <a:ea typeface="Calibri"/>
@@ -3951,7 +4470,7 @@
                         </a:rPr>
                         <a:t>%)</a:t>
                       </a:r>
-                      <a:endParaRPr lang="en-US" sz="1800" dirty="0">
+                      <a:endParaRPr lang="en-US" sz="1200" dirty="0">
                         <a:effectLst/>
                         <a:latin typeface="Arial" panose="020B0604020202020204" pitchFamily="34" charset="0"/>
                         <a:ea typeface="Calibri"/>
@@ -3978,7 +4497,7 @@
                         </a:spcAft>
                       </a:pPr>
                       <a:r>
-                        <a:rPr lang="en-US" sz="1800" smtClean="0">
+                        <a:rPr lang="en-US" sz="1200" smtClean="0">
                           <a:effectLst/>
                           <a:latin typeface="Arial" panose="020B0604020202020204" pitchFamily="34" charset="0"/>
                           <a:ea typeface="Calibri"/>
@@ -3986,7 +4505,7 @@
                         </a:rPr>
                         <a:t>1045 (16.9%)</a:t>
                       </a:r>
-                      <a:endParaRPr lang="en-US" sz="1800" dirty="0">
+                      <a:endParaRPr lang="en-US" sz="1200" dirty="0">
                         <a:effectLst/>
                         <a:latin typeface="Arial" panose="020B0604020202020204" pitchFamily="34" charset="0"/>
                         <a:ea typeface="Calibri"/>
@@ -4019,14 +4538,14 @@
                         <a:defRPr/>
                       </a:pPr>
                       <a:r>
-                        <a:rPr lang="en-US" sz="1800" smtClean="0">
+                        <a:rPr lang="en-US" sz="1200" smtClean="0">
                           <a:effectLst/>
                           <a:latin typeface="Arial" panose="020B0604020202020204" pitchFamily="34" charset="0"/>
                           <a:cs typeface="Arial" panose="020B0604020202020204" pitchFamily="34" charset="0"/>
                         </a:rPr>
                         <a:t>1495 (24.2%)</a:t>
                       </a:r>
-                      <a:endParaRPr lang="en-US" sz="1800" dirty="0" smtClean="0">
+                      <a:endParaRPr lang="en-US" sz="1200" dirty="0" smtClean="0">
                         <a:effectLst/>
                         <a:latin typeface="Arial" panose="020B0604020202020204" pitchFamily="34" charset="0"/>
                         <a:ea typeface="Calibri"/>
@@ -4045,7 +4564,7 @@
                           <a:spcPts val="0"/>
                         </a:spcAft>
                       </a:pPr>
-                      <a:endParaRPr lang="en-US" sz="1800" dirty="0">
+                      <a:endParaRPr lang="en-US" sz="1200" dirty="0">
                         <a:effectLst/>
                         <a:latin typeface="Arial" panose="020B0604020202020204" pitchFamily="34" charset="0"/>
                         <a:ea typeface="Calibri"/>
@@ -4072,7 +4591,7 @@
                         </a:spcAft>
                       </a:pPr>
                       <a:r>
-                        <a:rPr lang="en-US" sz="1800" smtClean="0">
+                        <a:rPr lang="en-US" sz="1200" smtClean="0">
                           <a:effectLst/>
                           <a:latin typeface="Arial" panose="020B0604020202020204" pitchFamily="34" charset="0"/>
                           <a:ea typeface="Calibri"/>
@@ -4080,7 +4599,7 @@
                         </a:rPr>
                         <a:t>344 (5.6%)</a:t>
                       </a:r>
-                      <a:endParaRPr lang="en-US" sz="1800" dirty="0">
+                      <a:endParaRPr lang="en-US" sz="1200" dirty="0">
                         <a:effectLst/>
                         <a:latin typeface="Arial" panose="020B0604020202020204" pitchFamily="34" charset="0"/>
                         <a:ea typeface="Calibri"/>
@@ -4107,15 +4626,50 @@
                         </a:spcAft>
                       </a:pPr>
                       <a:r>
-                        <a:rPr lang="en-US" sz="1800" smtClean="0">
+                        <a:rPr lang="en-US" sz="1200" smtClean="0">
                           <a:effectLst/>
                           <a:latin typeface="Arial" panose="020B0604020202020204" pitchFamily="34" charset="0"/>
                           <a:ea typeface="Calibri"/>
                           <a:cs typeface="Arial" panose="020B0604020202020204" pitchFamily="34" charset="0"/>
                         </a:rPr>
+                        <a:t>1844 (29.8%)</a:t>
+                      </a:r>
+                      <a:endParaRPr lang="en-US" sz="1200" dirty="0">
+                        <a:effectLst/>
+                        <a:latin typeface="Arial" panose="020B0604020202020204" pitchFamily="34" charset="0"/>
+                        <a:ea typeface="Calibri"/>
+                        <a:cs typeface="Arial" panose="020B0604020202020204" pitchFamily="34" charset="0"/>
+                      </a:endParaRPr>
+                    </a:p>
+                  </a:txBody>
+                  <a:tcPr marL="60538" marR="60538" marT="0" marB="0"/>
+                </a:tc>
+                <a:tc>
+                  <a:txBody>
+                    <a:bodyPr/>
+                    <a:lstStyle/>
+                    <a:p>
+                      <a:pPr marL="0" marR="0" algn="ctr">
+                        <a:lnSpc>
+                          <a:spcPct val="115000"/>
+                        </a:lnSpc>
+                        <a:spcBef>
+                          <a:spcPts val="0"/>
+                        </a:spcBef>
+                        <a:spcAft>
+                          <a:spcPts val="0"/>
+                        </a:spcAft>
+                      </a:pPr>
+                      <a:r>
+                        <a:rPr lang="en-US" sz="1200" smtClean="0">
+                          <a:effectLst/>
+                          <a:latin typeface="Arial" panose="020B0604020202020204" pitchFamily="34" charset="0"/>
+                          <a:ea typeface="Calibri"/>
+                          <a:cs typeface="Arial" panose="020B0604020202020204" pitchFamily="34" charset="0"/>
+                        </a:rPr>
                         <a:t>1486 (24.0%)</a:t>
                       </a:r>
-                      <a:endParaRPr lang="en-US" sz="1800" dirty="0">
+                      <a:endParaRPr lang="en-US" sz="1200" dirty="0">
                         <a:effectLst/>
                         <a:latin typeface="Arial" panose="020B0604020202020204" pitchFamily="34" charset="0"/>
                         <a:ea typeface="Calibri"/>
@@ -4149,7 +4703,7 @@
                         <a:tabLst/>
                         <a:defRPr/>
                       </a:pPr>
-                      <a:endParaRPr lang="en-US" sz="1800" smtClean="0">
+                      <a:endParaRPr lang="en-US" sz="1200" smtClean="0">
                         <a:effectLst/>
                         <a:latin typeface="Arial" panose="020B0604020202020204" pitchFamily="34" charset="0"/>
                         <a:cs typeface="Arial" panose="020B0604020202020204" pitchFamily="34" charset="0"/>
@@ -4174,7 +4728,7 @@
                         <a:defRPr/>
                       </a:pPr>
                       <a:r>
-                        <a:rPr lang="en-US" sz="1800" smtClean="0">
+                        <a:rPr lang="en-US" sz="1200" smtClean="0">
                           <a:effectLst/>
                           <a:latin typeface="Arial" panose="020B0604020202020204" pitchFamily="34" charset="0"/>
                           <a:cs typeface="Arial" panose="020B0604020202020204" pitchFamily="34" charset="0"/>
@@ -4182,14 +4736,14 @@
                         <a:t>p </a:t>
                       </a:r>
                       <a:r>
-                        <a:rPr lang="en-US" sz="1800" dirty="0" smtClean="0">
+                        <a:rPr lang="en-US" sz="1200" dirty="0" smtClean="0">
                           <a:effectLst/>
                           <a:latin typeface="Arial" panose="020B0604020202020204" pitchFamily="34" charset="0"/>
                           <a:cs typeface="Arial" panose="020B0604020202020204" pitchFamily="34" charset="0"/>
                         </a:rPr>
                         <a:t>&lt; 0.001</a:t>
                       </a:r>
-                      <a:endParaRPr lang="en-US" sz="1800" dirty="0" smtClean="0">
+                      <a:endParaRPr lang="en-US" sz="1200" dirty="0" smtClean="0">
                         <a:effectLst/>
                         <a:latin typeface="Arial" panose="020B0604020202020204" pitchFamily="34" charset="0"/>
                         <a:ea typeface="Calibri"/>
@@ -4208,7 +4762,7 @@
                           <a:spcPts val="0"/>
                         </a:spcAft>
                       </a:pPr>
-                      <a:endParaRPr lang="en-US" sz="1800" dirty="0">
+                      <a:endParaRPr lang="en-US" sz="1200" dirty="0">
                         <a:effectLst/>
                         <a:latin typeface="Arial" panose="020B0604020202020204" pitchFamily="34" charset="0"/>
                         <a:ea typeface="Calibri"/>
@@ -4241,14 +4795,14 @@
                         <a:defRPr/>
                       </a:pPr>
                       <a:r>
-                        <a:rPr lang="en-US" sz="1800" smtClean="0">
+                        <a:rPr lang="en-US" sz="1200" smtClean="0">
                           <a:effectLst/>
                           <a:latin typeface="Arial" panose="020B0604020202020204" pitchFamily="34" charset="0"/>
                           <a:cs typeface="Arial" panose="020B0604020202020204" pitchFamily="34" charset="0"/>
                         </a:rPr>
                         <a:t>844 (13.6%)</a:t>
                       </a:r>
-                      <a:endParaRPr lang="en-US" sz="1800" dirty="0" smtClean="0">
+                      <a:endParaRPr lang="en-US" sz="1200" dirty="0" smtClean="0">
                         <a:effectLst/>
                         <a:latin typeface="Arial" panose="020B0604020202020204" pitchFamily="34" charset="0"/>
                         <a:ea typeface="Calibri"/>
@@ -4267,7 +4821,7 @@
                           <a:spcPts val="0"/>
                         </a:spcAft>
                       </a:pPr>
-                      <a:endParaRPr lang="en-US" sz="1800" dirty="0">
+                      <a:endParaRPr lang="en-US" sz="1200" dirty="0">
                         <a:effectLst/>
                         <a:latin typeface="Arial" panose="020B0604020202020204" pitchFamily="34" charset="0"/>
                         <a:ea typeface="Calibri"/>
@@ -4294,7 +4848,7 @@
                         </a:spcAft>
                       </a:pPr>
                       <a:r>
-                        <a:rPr lang="en-US" sz="1800" smtClean="0">
+                        <a:rPr lang="en-US" sz="1200" smtClean="0">
                           <a:effectLst/>
                           <a:latin typeface="Arial" panose="020B0604020202020204" pitchFamily="34" charset="0"/>
                           <a:ea typeface="Calibri"/>
@@ -4302,7 +4856,7 @@
                         </a:rPr>
                         <a:t>609 (9.8%)</a:t>
                       </a:r>
-                      <a:endParaRPr lang="en-US" sz="1800" dirty="0">
+                      <a:endParaRPr lang="en-US" sz="1200" dirty="0">
                         <a:effectLst/>
                         <a:latin typeface="Arial" panose="020B0604020202020204" pitchFamily="34" charset="0"/>
                         <a:ea typeface="Calibri"/>
@@ -4329,7 +4883,7 @@
                         </a:spcAft>
                       </a:pPr>
                       <a:r>
-                        <a:rPr lang="en-US" sz="1800" smtClean="0">
+                        <a:rPr lang="en-US" sz="1200" smtClean="0">
                           <a:effectLst/>
                           <a:latin typeface="Arial" panose="020B0604020202020204" pitchFamily="34" charset="0"/>
                           <a:ea typeface="Calibri"/>
@@ -4337,7 +4891,7 @@
                         </a:rPr>
                         <a:t>403 (6.5%)</a:t>
                       </a:r>
-                      <a:endParaRPr lang="en-US" sz="1800" dirty="0">
+                      <a:endParaRPr lang="en-US" sz="1200" dirty="0">
                         <a:effectLst/>
                         <a:latin typeface="Arial" panose="020B0604020202020204" pitchFamily="34" charset="0"/>
                         <a:ea typeface="Calibri"/>
@@ -4370,14 +4924,14 @@
                         <a:defRPr/>
                       </a:pPr>
                       <a:r>
-                        <a:rPr lang="en-US" sz="1800" smtClean="0">
+                        <a:rPr lang="en-US" sz="1200" smtClean="0">
                           <a:effectLst/>
                           <a:latin typeface="Arial" panose="020B0604020202020204" pitchFamily="34" charset="0"/>
                           <a:cs typeface="Arial" panose="020B0604020202020204" pitchFamily="34" charset="0"/>
                         </a:rPr>
                         <a:t>689 (11.1%)</a:t>
                       </a:r>
-                      <a:endParaRPr lang="en-US" sz="1800" dirty="0" smtClean="0">
+                      <a:endParaRPr lang="en-US" sz="1200" dirty="0" smtClean="0">
                         <a:effectLst/>
                         <a:latin typeface="Arial" panose="020B0604020202020204" pitchFamily="34" charset="0"/>
                         <a:ea typeface="Calibri"/>
@@ -4396,7 +4950,7 @@
                           <a:spcPts val="0"/>
                         </a:spcAft>
                       </a:pPr>
-                      <a:endParaRPr lang="en-US" sz="1800" dirty="0">
+                      <a:endParaRPr lang="en-US" sz="1200" dirty="0">
                         <a:effectLst/>
                         <a:latin typeface="Arial" panose="020B0604020202020204" pitchFamily="34" charset="0"/>
                         <a:ea typeface="Calibri"/>
@@ -4423,7 +4977,7 @@
                         </a:spcAft>
                       </a:pPr>
                       <a:r>
-                        <a:rPr lang="en-US" sz="1800" smtClean="0">
+                        <a:rPr lang="en-US" sz="1200" smtClean="0">
                           <a:effectLst/>
                           <a:latin typeface="Arial" panose="020B0604020202020204" pitchFamily="34" charset="0"/>
                           <a:ea typeface="Calibri"/>
@@ -4431,7 +4985,7 @@
                         </a:rPr>
                         <a:t>71 (1.1%)</a:t>
                       </a:r>
-                      <a:endParaRPr lang="en-US" sz="1800" dirty="0">
+                      <a:endParaRPr lang="en-US" sz="1200" dirty="0">
                         <a:effectLst/>
                         <a:latin typeface="Arial" panose="020B0604020202020204" pitchFamily="34" charset="0"/>
                         <a:ea typeface="Calibri"/>
@@ -4458,16 +5012,60 @@
                         </a:spcAft>
                       </a:pPr>
                       <a:r>
-                        <a:rPr lang="en-US" sz="1800" smtClean="0">
+                        <a:rPr lang="en-US" sz="1200" smtClean="0">
                           <a:effectLst/>
                           <a:latin typeface="Arial" panose="020B0604020202020204" pitchFamily="34" charset="0"/>
                           <a:ea typeface="Calibri"/>
                           <a:cs typeface="Arial" panose="020B0604020202020204" pitchFamily="34" charset="0"/>
                         </a:rPr>
+                        <a:t>977</a:t>
+                      </a:r>
+                      <a:r>
+                        <a:rPr lang="en-US" sz="1200" baseline="0" smtClean="0">
+                          <a:effectLst/>
+                          <a:latin typeface="Arial" panose="020B0604020202020204" pitchFamily="34" charset="0"/>
+                          <a:ea typeface="Calibri"/>
+                          <a:cs typeface="Arial" panose="020B0604020202020204" pitchFamily="34" charset="0"/>
+                        </a:rPr>
+                        <a:t> (15.8%)</a:t>
+                      </a:r>
+                      <a:endParaRPr lang="en-US" sz="1200" dirty="0">
+                        <a:effectLst/>
+                        <a:latin typeface="Arial" panose="020B0604020202020204" pitchFamily="34" charset="0"/>
+                        <a:ea typeface="Calibri"/>
+                        <a:cs typeface="Arial" panose="020B0604020202020204" pitchFamily="34" charset="0"/>
+                      </a:endParaRPr>
+                    </a:p>
+                  </a:txBody>
+                  <a:tcPr marL="60538" marR="60538" marT="0" marB="0"/>
+                </a:tc>
+                <a:tc>
+                  <a:txBody>
+                    <a:bodyPr/>
+                    <a:lstStyle/>
+                    <a:p>
+                      <a:pPr marL="0" marR="0" algn="ctr">
+                        <a:lnSpc>
+                          <a:spcPct val="115000"/>
+                        </a:lnSpc>
+                        <a:spcBef>
+                          <a:spcPts val="0"/>
+                        </a:spcBef>
+                        <a:spcAft>
+                          <a:spcPts val="0"/>
+                        </a:spcAft>
+                      </a:pPr>
+                      <a:r>
+                        <a:rPr lang="en-US" sz="1200" smtClean="0">
+                          <a:effectLst/>
+                          <a:latin typeface="Arial" panose="020B0604020202020204" pitchFamily="34" charset="0"/>
+                          <a:ea typeface="Calibri"/>
+                          <a:cs typeface="Arial" panose="020B0604020202020204" pitchFamily="34" charset="0"/>
+                        </a:rPr>
                         <a:t>814</a:t>
                       </a:r>
                       <a:r>
-                        <a:rPr lang="en-US" sz="1800" baseline="0" smtClean="0">
+                        <a:rPr lang="en-US" sz="1200" baseline="0" smtClean="0">
                           <a:effectLst/>
                           <a:latin typeface="Arial" panose="020B0604020202020204" pitchFamily="34" charset="0"/>
                           <a:ea typeface="Calibri"/>
@@ -4475,7 +5073,7 @@
                         </a:rPr>
                         <a:t> (13.2%)</a:t>
                       </a:r>
-                      <a:endParaRPr lang="en-US" sz="1800" dirty="0">
+                      <a:endParaRPr lang="en-US" sz="1200" dirty="0">
                         <a:effectLst/>
                         <a:latin typeface="Arial" panose="020B0604020202020204" pitchFamily="34" charset="0"/>
                         <a:ea typeface="Calibri"/>
@@ -4509,7 +5107,7 @@
                         <a:tabLst/>
                         <a:defRPr/>
                       </a:pPr>
-                      <a:endParaRPr lang="en-US" sz="1800" smtClean="0">
+                      <a:endParaRPr lang="en-US" sz="1200" smtClean="0">
                         <a:effectLst/>
                         <a:latin typeface="Arial" panose="020B0604020202020204" pitchFamily="34" charset="0"/>
                         <a:cs typeface="Arial" panose="020B0604020202020204" pitchFamily="34" charset="0"/>
@@ -4534,7 +5132,7 @@
                         <a:defRPr/>
                       </a:pPr>
                       <a:r>
-                        <a:rPr lang="en-US" sz="1800" smtClean="0">
+                        <a:rPr lang="en-US" sz="1200" smtClean="0">
                           <a:effectLst/>
                           <a:latin typeface="Arial" panose="020B0604020202020204" pitchFamily="34" charset="0"/>
                           <a:cs typeface="Arial" panose="020B0604020202020204" pitchFamily="34" charset="0"/>
@@ -4542,14 +5140,14 @@
                         <a:t>p </a:t>
                       </a:r>
                       <a:r>
-                        <a:rPr lang="en-US" sz="1800" dirty="0" smtClean="0">
+                        <a:rPr lang="en-US" sz="1200" dirty="0" smtClean="0">
                           <a:effectLst/>
                           <a:latin typeface="Arial" panose="020B0604020202020204" pitchFamily="34" charset="0"/>
                           <a:cs typeface="Arial" panose="020B0604020202020204" pitchFamily="34" charset="0"/>
                         </a:rPr>
                         <a:t>&lt; 0.0001</a:t>
                       </a:r>
-                      <a:endParaRPr lang="en-US" sz="1800" dirty="0" smtClean="0">
+                      <a:endParaRPr lang="en-US" sz="1200" dirty="0" smtClean="0">
                         <a:effectLst/>
                         <a:latin typeface="Arial" panose="020B0604020202020204" pitchFamily="34" charset="0"/>
                         <a:ea typeface="Calibri"/>
@@ -4568,7 +5166,7 @@
                           <a:spcPts val="0"/>
                         </a:spcAft>
                       </a:pPr>
-                      <a:endParaRPr lang="en-US" sz="1800" dirty="0">
+                      <a:endParaRPr lang="en-US" sz="1200" dirty="0">
                         <a:effectLst/>
                         <a:latin typeface="Arial" panose="020B0604020202020204" pitchFamily="34" charset="0"/>
                         <a:ea typeface="Calibri"/>
@@ -4601,14 +5199,14 @@
                         <a:defRPr/>
                       </a:pPr>
                       <a:r>
-                        <a:rPr lang="en-US" sz="1800" smtClean="0">
+                        <a:rPr lang="en-US" sz="1200" smtClean="0">
                           <a:effectLst/>
                           <a:latin typeface="Arial" panose="020B0604020202020204" pitchFamily="34" charset="0"/>
                           <a:cs typeface="Arial" panose="020B0604020202020204" pitchFamily="34" charset="0"/>
                         </a:rPr>
                         <a:t>448 (7.2%)</a:t>
                       </a:r>
-                      <a:endParaRPr lang="en-US" sz="1800" dirty="0" smtClean="0">
+                      <a:endParaRPr lang="en-US" sz="1200" dirty="0" smtClean="0">
                         <a:effectLst/>
                         <a:latin typeface="Arial" panose="020B0604020202020204" pitchFamily="34" charset="0"/>
                         <a:ea typeface="Calibri"/>
@@ -4627,7 +5225,7 @@
                           <a:spcPts val="0"/>
                         </a:spcAft>
                       </a:pPr>
-                      <a:endParaRPr lang="en-US" sz="1800" dirty="0">
+                      <a:endParaRPr lang="en-US" sz="1200" dirty="0">
                         <a:effectLst/>
                         <a:latin typeface="Arial" panose="020B0604020202020204" pitchFamily="34" charset="0"/>
                         <a:ea typeface="Calibri"/>
@@ -4654,7 +5252,7 @@
                         </a:spcAft>
                       </a:pPr>
                       <a:r>
-                        <a:rPr lang="en-US" sz="1800" smtClean="0">
+                        <a:rPr lang="en-US" sz="1200" smtClean="0">
                           <a:effectLst/>
                           <a:latin typeface="Arial" panose="020B0604020202020204" pitchFamily="34" charset="0"/>
                           <a:ea typeface="Calibri"/>
@@ -4662,7 +5260,7 @@
                         </a:rPr>
                         <a:t>295 (4.8%)</a:t>
                       </a:r>
-                      <a:endParaRPr lang="en-US" sz="1800" dirty="0">
+                      <a:endParaRPr lang="en-US" sz="1200" dirty="0">
                         <a:effectLst/>
                         <a:latin typeface="Arial" panose="020B0604020202020204" pitchFamily="34" charset="0"/>
                         <a:ea typeface="Calibri"/>
@@ -4689,7 +5287,7 @@
                         </a:spcAft>
                       </a:pPr>
                       <a:r>
-                        <a:rPr lang="en-US" sz="1800" smtClean="0">
+                        <a:rPr lang="en-US" sz="1200" smtClean="0">
                           <a:effectLst/>
                           <a:latin typeface="Arial" panose="020B0604020202020204" pitchFamily="34" charset="0"/>
                           <a:ea typeface="Calibri"/>
@@ -4697,7 +5295,7 @@
                         </a:rPr>
                         <a:t>122 (2.0%)</a:t>
                       </a:r>
-                      <a:endParaRPr lang="en-US" sz="1800" dirty="0">
+                      <a:endParaRPr lang="en-US" sz="1200" dirty="0">
                         <a:effectLst/>
                         <a:latin typeface="Arial" panose="020B0604020202020204" pitchFamily="34" charset="0"/>
                         <a:ea typeface="Calibri"/>
@@ -4730,14 +5328,14 @@
                         <a:defRPr/>
                       </a:pPr>
                       <a:r>
-                        <a:rPr lang="en-US" sz="1800" smtClean="0">
+                        <a:rPr lang="en-US" sz="1200" smtClean="0">
                           <a:effectLst/>
                           <a:latin typeface="Arial" panose="020B0604020202020204" pitchFamily="34" charset="0"/>
                           <a:cs typeface="Arial" panose="020B0604020202020204" pitchFamily="34" charset="0"/>
                         </a:rPr>
                         <a:t>245 (4.0%)</a:t>
                       </a:r>
-                      <a:endParaRPr lang="en-US" sz="1800" dirty="0" smtClean="0">
+                      <a:endParaRPr lang="en-US" sz="1200" dirty="0" smtClean="0">
                         <a:effectLst/>
                         <a:latin typeface="Arial" panose="020B0604020202020204" pitchFamily="34" charset="0"/>
                         <a:ea typeface="Calibri"/>
@@ -4756,7 +5354,7 @@
                           <a:spcPts val="0"/>
                         </a:spcAft>
                       </a:pPr>
-                      <a:endParaRPr lang="en-US" sz="1800" dirty="0">
+                      <a:endParaRPr lang="en-US" sz="1200" dirty="0">
                         <a:effectLst/>
                         <a:latin typeface="Arial" panose="020B0604020202020204" pitchFamily="34" charset="0"/>
                         <a:ea typeface="Calibri"/>
@@ -4783,7 +5381,7 @@
                         </a:spcAft>
                       </a:pPr>
                       <a:r>
-                        <a:rPr lang="en-US" sz="1800" smtClean="0">
+                        <a:rPr lang="en-US" sz="1200" smtClean="0">
                           <a:effectLst/>
                           <a:latin typeface="Arial" panose="020B0604020202020204" pitchFamily="34" charset="0"/>
                           <a:ea typeface="Calibri"/>
@@ -4791,7 +5389,7 @@
                         </a:rPr>
                         <a:t>20 (0.3%)</a:t>
                       </a:r>
-                      <a:endParaRPr lang="en-US" sz="1800" dirty="0">
+                      <a:endParaRPr lang="en-US" sz="1200" dirty="0">
                         <a:effectLst/>
                         <a:latin typeface="Arial" panose="020B0604020202020204" pitchFamily="34" charset="0"/>
                         <a:ea typeface="Calibri"/>
@@ -4818,15 +5416,50 @@
                         </a:spcAft>
                       </a:pPr>
                       <a:r>
-                        <a:rPr lang="en-US" sz="1800" smtClean="0">
+                        <a:rPr lang="en-US" sz="1200" smtClean="0">
                           <a:effectLst/>
                           <a:latin typeface="Arial" panose="020B0604020202020204" pitchFamily="34" charset="0"/>
                           <a:ea typeface="Calibri"/>
                           <a:cs typeface="Arial" panose="020B0604020202020204" pitchFamily="34" charset="0"/>
                         </a:rPr>
+                        <a:t>513 (8.3%)</a:t>
+                      </a:r>
+                      <a:endParaRPr lang="en-US" sz="1200" dirty="0">
+                        <a:effectLst/>
+                        <a:latin typeface="Arial" panose="020B0604020202020204" pitchFamily="34" charset="0"/>
+                        <a:ea typeface="Calibri"/>
+                        <a:cs typeface="Arial" panose="020B0604020202020204" pitchFamily="34" charset="0"/>
+                      </a:endParaRPr>
+                    </a:p>
+                  </a:txBody>
+                  <a:tcPr marL="60538" marR="60538" marT="0" marB="0"/>
+                </a:tc>
+                <a:tc>
+                  <a:txBody>
+                    <a:bodyPr/>
+                    <a:lstStyle/>
+                    <a:p>
+                      <a:pPr marL="0" marR="0" algn="ctr">
+                        <a:lnSpc>
+                          <a:spcPct val="115000"/>
+                        </a:lnSpc>
+                        <a:spcBef>
+                          <a:spcPts val="0"/>
+                        </a:spcBef>
+                        <a:spcAft>
+                          <a:spcPts val="0"/>
+                        </a:spcAft>
+                      </a:pPr>
+                      <a:r>
+                        <a:rPr lang="en-US" sz="1200" smtClean="0">
+                          <a:effectLst/>
+                          <a:latin typeface="Arial" panose="020B0604020202020204" pitchFamily="34" charset="0"/>
+                          <a:ea typeface="Calibri"/>
+                          <a:cs typeface="Arial" panose="020B0604020202020204" pitchFamily="34" charset="0"/>
+                        </a:rPr>
                         <a:t>417 (6.7%)</a:t>
                       </a:r>
-                      <a:endParaRPr lang="en-US" sz="1800" dirty="0">
+                      <a:endParaRPr lang="en-US" sz="1200" dirty="0">
                         <a:effectLst/>
                         <a:latin typeface="Arial" panose="020B0604020202020204" pitchFamily="34" charset="0"/>
                         <a:ea typeface="Calibri"/>
@@ -4854,7 +5487,7 @@
                           <a:spcPts val="0"/>
                         </a:spcAft>
                       </a:pPr>
-                      <a:endParaRPr lang="en-US" sz="1800" smtClean="0">
+                      <a:endParaRPr lang="en-US" sz="1200" smtClean="0">
                         <a:effectLst/>
                         <a:latin typeface="Arial" panose="020B0604020202020204" pitchFamily="34" charset="0"/>
                         <a:cs typeface="Arial" panose="020B0604020202020204" pitchFamily="34" charset="0"/>
@@ -4873,7 +5506,7 @@
                         </a:spcAft>
                       </a:pPr>
                       <a:r>
-                        <a:rPr lang="en-US" sz="1800" smtClean="0">
+                        <a:rPr lang="en-US" sz="1200" smtClean="0">
                           <a:effectLst/>
                           <a:latin typeface="Arial" panose="020B0604020202020204" pitchFamily="34" charset="0"/>
                           <a:cs typeface="Arial" panose="020B0604020202020204" pitchFamily="34" charset="0"/>
@@ -4881,7 +5514,7 @@
                         <a:t>B</a:t>
                       </a:r>
                       <a:r>
-                        <a:rPr lang="en-US" sz="1800" baseline="0" smtClean="0">
+                        <a:rPr lang="en-US" sz="1200" baseline="0" smtClean="0">
                           <a:effectLst/>
                           <a:latin typeface="Arial" panose="020B0604020202020204" pitchFamily="34" charset="0"/>
                           <a:cs typeface="Arial" panose="020B0604020202020204" pitchFamily="34" charset="0"/>
@@ -4889,7 +5522,7 @@
                         <a:t> &amp; </a:t>
                       </a:r>
                       <a:r>
-                        <a:rPr lang="en-US" sz="1800" smtClean="0">
+                        <a:rPr lang="en-US" sz="1200" smtClean="0">
                           <a:effectLst/>
                           <a:latin typeface="Arial" panose="020B0604020202020204" pitchFamily="34" charset="0"/>
                           <a:cs typeface="Arial" panose="020B0604020202020204" pitchFamily="34" charset="0"/>
@@ -4897,7 +5530,7 @@
                         <a:t>H </a:t>
                       </a:r>
                       <a:r>
-                        <a:rPr lang="en-US" sz="1800" dirty="0" smtClean="0">
+                        <a:rPr lang="en-US" sz="1200" dirty="0" smtClean="0">
                           <a:effectLst/>
                           <a:latin typeface="Arial" panose="020B0604020202020204" pitchFamily="34" charset="0"/>
                           <a:cs typeface="Arial" panose="020B0604020202020204" pitchFamily="34" charset="0"/>
@@ -4905,7 +5538,7 @@
                         <a:t>p </a:t>
                       </a:r>
                       <a:r>
-                        <a:rPr lang="en-US" sz="1800" smtClean="0">
+                        <a:rPr lang="en-US" sz="1200" smtClean="0">
                           <a:effectLst/>
                           <a:latin typeface="Arial" panose="020B0604020202020204" pitchFamily="34" charset="0"/>
                           <a:cs typeface="Arial" panose="020B0604020202020204" pitchFamily="34" charset="0"/>
@@ -4925,7 +5558,7 @@
                           <a:spcPts val="0"/>
                         </a:spcAft>
                       </a:pPr>
-                      <a:endParaRPr lang="en-US" sz="1800" dirty="0">
+                      <a:endParaRPr lang="en-US" sz="1200" dirty="0">
                         <a:effectLst/>
                         <a:latin typeface="Arial" panose="020B0604020202020204" pitchFamily="34" charset="0"/>
                         <a:ea typeface="Calibri"/>
@@ -4952,14 +5585,14 @@
                         </a:spcAft>
                       </a:pPr>
                       <a:r>
-                        <a:rPr lang="en-US" sz="1800" smtClean="0">
+                        <a:rPr lang="en-US" sz="1200" smtClean="0">
                           <a:effectLst/>
                           <a:latin typeface="Arial" panose="020B0604020202020204" pitchFamily="34" charset="0"/>
                           <a:cs typeface="Arial" panose="020B0604020202020204" pitchFamily="34" charset="0"/>
                         </a:rPr>
                         <a:t>1661 (26.8%)</a:t>
                       </a:r>
-                      <a:endParaRPr lang="en-US" sz="1800" dirty="0">
+                      <a:endParaRPr lang="en-US" sz="1200" dirty="0">
                         <a:effectLst/>
                         <a:latin typeface="Arial" panose="020B0604020202020204" pitchFamily="34" charset="0"/>
                         <a:ea typeface="Calibri"/>
@@ -4986,7 +5619,7 @@
                         </a:spcAft>
                       </a:pPr>
                       <a:r>
-                        <a:rPr lang="en-US" sz="1800" smtClean="0">
+                        <a:rPr lang="en-US" sz="1200" smtClean="0">
                           <a:effectLst/>
                           <a:latin typeface="Arial" panose="020B0604020202020204" pitchFamily="34" charset="0"/>
                           <a:ea typeface="Calibri"/>
@@ -4994,7 +5627,7 @@
                         </a:rPr>
                         <a:t>1222 (19.7%)</a:t>
                       </a:r>
-                      <a:endParaRPr lang="en-US" sz="1800" dirty="0">
+                      <a:endParaRPr lang="en-US" sz="1200" dirty="0">
                         <a:effectLst/>
                         <a:latin typeface="Arial" panose="020B0604020202020204" pitchFamily="34" charset="0"/>
                         <a:ea typeface="Calibri"/>
@@ -5021,7 +5654,7 @@
                         </a:spcAft>
                       </a:pPr>
                       <a:r>
-                        <a:rPr lang="en-US" sz="1800" smtClean="0">
+                        <a:rPr lang="en-US" sz="1200" smtClean="0">
                           <a:effectLst/>
                           <a:latin typeface="Arial" panose="020B0604020202020204" pitchFamily="34" charset="0"/>
                           <a:ea typeface="Calibri"/>
@@ -5029,7 +5662,7 @@
                         </a:rPr>
                         <a:t>953 (15.4%)</a:t>
                       </a:r>
-                      <a:endParaRPr lang="en-US" sz="1800" dirty="0">
+                      <a:endParaRPr lang="en-US" sz="1200" dirty="0">
                         <a:effectLst/>
                         <a:latin typeface="Arial" panose="020B0604020202020204" pitchFamily="34" charset="0"/>
                         <a:ea typeface="Calibri"/>
@@ -5056,14 +5689,14 @@
                         </a:spcAft>
                       </a:pPr>
                       <a:r>
-                        <a:rPr lang="en-US" sz="1800" smtClean="0">
+                        <a:rPr lang="en-US" sz="1200" smtClean="0">
                           <a:effectLst/>
                           <a:latin typeface="Arial" panose="020B0604020202020204" pitchFamily="34" charset="0"/>
                           <a:cs typeface="Arial" panose="020B0604020202020204" pitchFamily="34" charset="0"/>
                         </a:rPr>
                         <a:t>1620 (26.2%)</a:t>
                       </a:r>
-                      <a:endParaRPr lang="en-US" sz="1800" dirty="0">
+                      <a:endParaRPr lang="en-US" sz="1200" dirty="0">
                         <a:effectLst/>
                         <a:latin typeface="Arial" panose="020B0604020202020204" pitchFamily="34" charset="0"/>
                         <a:ea typeface="Calibri"/>
@@ -5090,7 +5723,7 @@
                         </a:spcAft>
                       </a:pPr>
                       <a:r>
-                        <a:rPr lang="en-US" sz="1800" smtClean="0">
+                        <a:rPr lang="en-US" sz="1200" smtClean="0">
                           <a:effectLst/>
                           <a:latin typeface="Arial" panose="020B0604020202020204" pitchFamily="34" charset="0"/>
                           <a:ea typeface="Calibri"/>
@@ -5119,15 +5752,50 @@
                         </a:spcAft>
                       </a:pPr>
                       <a:r>
-                        <a:rPr lang="en-US" sz="1800" smtClean="0">
+                        <a:rPr lang="en-US" sz="1200" smtClean="0">
                           <a:effectLst/>
                           <a:latin typeface="Arial" panose="020B0604020202020204" pitchFamily="34" charset="0"/>
                           <a:ea typeface="Calibri"/>
                           <a:cs typeface="Arial" panose="020B0604020202020204" pitchFamily="34" charset="0"/>
                         </a:rPr>
+                        <a:t>2103 (34.0%)</a:t>
+                      </a:r>
+                      <a:endParaRPr lang="en-US" sz="1200" dirty="0">
+                        <a:effectLst/>
+                        <a:latin typeface="Arial" panose="020B0604020202020204" pitchFamily="34" charset="0"/>
+                        <a:ea typeface="Calibri"/>
+                        <a:cs typeface="Arial" panose="020B0604020202020204" pitchFamily="34" charset="0"/>
+                      </a:endParaRPr>
+                    </a:p>
+                  </a:txBody>
+                  <a:tcPr marL="60538" marR="60538" marT="0" marB="0"/>
+                </a:tc>
+                <a:tc>
+                  <a:txBody>
+                    <a:bodyPr/>
+                    <a:lstStyle/>
+                    <a:p>
+                      <a:pPr marL="0" marR="0" algn="ctr">
+                        <a:lnSpc>
+                          <a:spcPct val="115000"/>
+                        </a:lnSpc>
+                        <a:spcBef>
+                          <a:spcPts val="0"/>
+                        </a:spcBef>
+                        <a:spcAft>
+                          <a:spcPts val="0"/>
+                        </a:spcAft>
+                      </a:pPr>
+                      <a:r>
+                        <a:rPr lang="en-US" sz="1200" smtClean="0">
+                          <a:effectLst/>
+                          <a:latin typeface="Arial" panose="020B0604020202020204" pitchFamily="34" charset="0"/>
+                          <a:ea typeface="Calibri"/>
+                          <a:cs typeface="Arial" panose="020B0604020202020204" pitchFamily="34" charset="0"/>
+                        </a:rPr>
                         <a:t>1580 (25.5%)</a:t>
                       </a:r>
-                      <a:endParaRPr lang="en-US" sz="1800" dirty="0">
+                      <a:endParaRPr lang="en-US" sz="1200" dirty="0">
                         <a:effectLst/>
                         <a:latin typeface="Arial" panose="020B0604020202020204" pitchFamily="34" charset="0"/>
                         <a:ea typeface="Calibri"/>
@@ -5155,7 +5823,7 @@
                           <a:spcPts val="0"/>
                         </a:spcAft>
                       </a:pPr>
-                      <a:endParaRPr lang="en-US" sz="1800" smtClean="0">
+                      <a:endParaRPr lang="en-US" sz="1200" smtClean="0">
                         <a:effectLst/>
                         <a:latin typeface="Arial" panose="020B0604020202020204" pitchFamily="34" charset="0"/>
                         <a:cs typeface="Arial" panose="020B0604020202020204" pitchFamily="34" charset="0"/>
@@ -5174,7 +5842,7 @@
                         </a:spcAft>
                       </a:pPr>
                       <a:r>
-                        <a:rPr lang="en-US" sz="1800" smtClean="0">
+                        <a:rPr lang="en-US" sz="1200" smtClean="0">
                           <a:effectLst/>
                           <a:latin typeface="Arial" panose="020B0604020202020204" pitchFamily="34" charset="0"/>
                           <a:cs typeface="Arial" panose="020B0604020202020204" pitchFamily="34" charset="0"/>
@@ -5182,7 +5850,7 @@
                         <a:t>Bonferroni </a:t>
                       </a:r>
                       <a:r>
-                        <a:rPr lang="en-US" sz="1800" dirty="0" smtClean="0">
+                        <a:rPr lang="en-US" sz="1200" dirty="0" smtClean="0">
                           <a:effectLst/>
                           <a:latin typeface="Arial" panose="020B0604020202020204" pitchFamily="34" charset="0"/>
                           <a:cs typeface="Arial" panose="020B0604020202020204" pitchFamily="34" charset="0"/>
@@ -5190,7 +5858,7 @@
                         <a:t>p </a:t>
                       </a:r>
                       <a:r>
-                        <a:rPr lang="en-US" sz="1800" smtClean="0">
+                        <a:rPr lang="en-US" sz="1200" smtClean="0">
                           <a:effectLst/>
                           <a:latin typeface="Arial" panose="020B0604020202020204" pitchFamily="34" charset="0"/>
                           <a:cs typeface="Arial" panose="020B0604020202020204" pitchFamily="34" charset="0"/>
@@ -5210,7 +5878,7 @@
                           <a:spcPts val="0"/>
                         </a:spcAft>
                       </a:pPr>
-                      <a:endParaRPr lang="en-US" sz="1800" dirty="0">
+                      <a:endParaRPr lang="en-US" sz="1200" dirty="0">
                         <a:effectLst/>
                         <a:latin typeface="Arial" panose="020B0604020202020204" pitchFamily="34" charset="0"/>
                         <a:ea typeface="Calibri"/>
@@ -5237,14 +5905,14 @@
                         </a:spcAft>
                       </a:pPr>
                       <a:r>
-                        <a:rPr lang="en-US" sz="1800" smtClean="0">
+                        <a:rPr lang="en-US" sz="1200" smtClean="0">
                           <a:effectLst/>
                           <a:latin typeface="Arial" panose="020B0604020202020204" pitchFamily="34" charset="0"/>
                           <a:cs typeface="Arial" panose="020B0604020202020204" pitchFamily="34" charset="0"/>
                         </a:rPr>
                         <a:t>221 (3.6%)</a:t>
                       </a:r>
-                      <a:endParaRPr lang="en-US" sz="1800" dirty="0">
+                      <a:endParaRPr lang="en-US" sz="1200" dirty="0">
                         <a:effectLst/>
                         <a:latin typeface="Arial" panose="020B0604020202020204" pitchFamily="34" charset="0"/>
                         <a:ea typeface="Calibri"/>
@@ -5271,7 +5939,7 @@
                         </a:spcAft>
                       </a:pPr>
                       <a:r>
-                        <a:rPr lang="en-US" sz="1800" smtClean="0">
+                        <a:rPr lang="en-US" sz="1200" smtClean="0">
                           <a:effectLst/>
                           <a:latin typeface="Arial" panose="020B0604020202020204" pitchFamily="34" charset="0"/>
                           <a:ea typeface="Calibri"/>
@@ -5279,7 +5947,7 @@
                         </a:rPr>
                         <a:t>122 (2.0%)</a:t>
                       </a:r>
-                      <a:endParaRPr lang="en-US" sz="1800" dirty="0">
+                      <a:endParaRPr lang="en-US" sz="1200" dirty="0">
                         <a:effectLst/>
                         <a:latin typeface="Arial" panose="020B0604020202020204" pitchFamily="34" charset="0"/>
                         <a:ea typeface="Calibri"/>
@@ -5306,7 +5974,7 @@
                         </a:spcAft>
                       </a:pPr>
                       <a:r>
-                        <a:rPr lang="en-US" sz="1800" smtClean="0">
+                        <a:rPr lang="en-US" sz="1200" smtClean="0">
                           <a:effectLst/>
                           <a:latin typeface="Arial" panose="020B0604020202020204" pitchFamily="34" charset="0"/>
                           <a:ea typeface="Calibri"/>
@@ -5314,7 +5982,7 @@
                         </a:rPr>
                         <a:t>25 (0.4%)</a:t>
                       </a:r>
-                      <a:endParaRPr lang="en-US" sz="1800" dirty="0">
+                      <a:endParaRPr lang="en-US" sz="1200" dirty="0">
                         <a:effectLst/>
                         <a:latin typeface="Arial" panose="020B0604020202020204" pitchFamily="34" charset="0"/>
                         <a:ea typeface="Calibri"/>
@@ -5341,14 +6009,14 @@
                         </a:spcAft>
                       </a:pPr>
                       <a:r>
-                        <a:rPr lang="en-US" sz="1800" smtClean="0">
+                        <a:rPr lang="en-US" sz="1200" smtClean="0">
                           <a:effectLst/>
                           <a:latin typeface="Arial" panose="020B0604020202020204" pitchFamily="34" charset="0"/>
                           <a:cs typeface="Arial" panose="020B0604020202020204" pitchFamily="34" charset="0"/>
                         </a:rPr>
                         <a:t>56 (0.9%)</a:t>
                       </a:r>
-                      <a:endParaRPr lang="en-US" sz="1800" dirty="0">
+                      <a:endParaRPr lang="en-US" sz="1200" dirty="0">
                         <a:effectLst/>
                         <a:latin typeface="Arial" panose="020B0604020202020204" pitchFamily="34" charset="0"/>
                         <a:ea typeface="Calibri"/>
@@ -5375,7 +6043,7 @@
                         </a:spcAft>
                       </a:pPr>
                       <a:r>
-                        <a:rPr lang="en-US" sz="1800" smtClean="0">
+                        <a:rPr lang="en-US" sz="1200" smtClean="0">
                           <a:effectLst/>
                           <a:latin typeface="Arial" panose="020B0604020202020204" pitchFamily="34" charset="0"/>
                           <a:ea typeface="Calibri"/>
@@ -5383,7 +6051,7 @@
                         </a:rPr>
                         <a:t>9 (0.1%)</a:t>
                       </a:r>
-                      <a:endParaRPr lang="en-US" sz="1800" dirty="0">
+                      <a:endParaRPr lang="en-US" sz="1200" dirty="0">
                         <a:effectLst/>
                         <a:latin typeface="Arial" panose="020B0604020202020204" pitchFamily="34" charset="0"/>
                         <a:ea typeface="Calibri"/>
@@ -5410,15 +6078,50 @@
                         </a:spcAft>
                       </a:pPr>
                       <a:r>
-                        <a:rPr lang="en-US" sz="1800" smtClean="0">
+                        <a:rPr lang="en-US" sz="1200" smtClean="0">
                           <a:effectLst/>
                           <a:latin typeface="Arial" panose="020B0604020202020204" pitchFamily="34" charset="0"/>
                           <a:ea typeface="Calibri"/>
                           <a:cs typeface="Arial" panose="020B0604020202020204" pitchFamily="34" charset="0"/>
                         </a:rPr>
+                        <a:t>213 (3.4%)</a:t>
+                      </a:r>
+                      <a:endParaRPr lang="en-US" sz="1200" dirty="0">
+                        <a:effectLst/>
+                        <a:latin typeface="Arial" panose="020B0604020202020204" pitchFamily="34" charset="0"/>
+                        <a:ea typeface="Calibri"/>
+                        <a:cs typeface="Arial" panose="020B0604020202020204" pitchFamily="34" charset="0"/>
+                      </a:endParaRPr>
+                    </a:p>
+                  </a:txBody>
+                  <a:tcPr marL="60538" marR="60538" marT="0" marB="0"/>
+                </a:tc>
+                <a:tc>
+                  <a:txBody>
+                    <a:bodyPr/>
+                    <a:lstStyle/>
+                    <a:p>
+                      <a:pPr marL="0" marR="0" algn="ctr">
+                        <a:lnSpc>
+                          <a:spcPct val="115000"/>
+                        </a:lnSpc>
+                        <a:spcBef>
+                          <a:spcPts val="0"/>
+                        </a:spcBef>
+                        <a:spcAft>
+                          <a:spcPts val="0"/>
+                        </a:spcAft>
+                      </a:pPr>
+                      <a:r>
+                        <a:rPr lang="en-US" sz="1200" smtClean="0">
+                          <a:effectLst/>
+                          <a:latin typeface="Arial" panose="020B0604020202020204" pitchFamily="34" charset="0"/>
+                          <a:ea typeface="Calibri"/>
+                          <a:cs typeface="Arial" panose="020B0604020202020204" pitchFamily="34" charset="0"/>
+                        </a:rPr>
                         <a:t>183 (3.0%)</a:t>
                       </a:r>
-                      <a:endParaRPr lang="en-US" sz="1800" dirty="0">
+                      <a:endParaRPr lang="en-US" sz="1200" dirty="0">
                         <a:effectLst/>
                         <a:latin typeface="Arial" panose="020B0604020202020204" pitchFamily="34" charset="0"/>
                         <a:ea typeface="Calibri"/>
@@ -5736,4 +6439,265 @@
   <a:objectDefaults/>
   <a:extraClrSchemeLst/>
 </a:theme>
+</file>
+
+<file path=ppt/theme/theme2.xml><?xml version="1.0" encoding="utf-8"?>
+<a:theme xmlns:a="http://schemas.openxmlformats.org/drawingml/2006/main" name="Office Theme">
+  <a:themeElements>
+    <a:clrScheme name="Office">
+      <a:dk1>
+        <a:sysClr val="windowText" lastClr="000000"/>
+      </a:dk1>
+      <a:lt1>
+        <a:sysClr val="window" lastClr="FFFFFF"/>
+      </a:lt1>
+      <a:dk2>
+        <a:srgbClr val="44546A"/>
+      </a:dk2>
+      <a:lt2>
+        <a:srgbClr val="E7E6E6"/>
+      </a:lt2>
+      <a:accent1>
+        <a:srgbClr val="5B9BD5"/>
+      </a:accent1>
+      <a:accent2>
+        <a:srgbClr val="ED7D31"/>
+      </a:accent2>
+      <a:accent3>
+        <a:srgbClr val="A5A5A5"/>
+      </a:accent3>
+      <a:accent4>
+        <a:srgbClr val="FFC000"/>
+      </a:accent4>
+      <a:accent5>
+        <a:srgbClr val="4472C4"/>
+      </a:accent5>
+      <a:accent6>
+        <a:srgbClr val="70AD47"/>
+      </a:accent6>
+      <a:hlink>
+        <a:srgbClr val="0563C1"/>
+      </a:hlink>
+      <a:folHlink>
+        <a:srgbClr val="954F72"/>
+      </a:folHlink>
+    </a:clrScheme>
+    <a:fontScheme name="Office">
+      <a:majorFont>
+        <a:latin typeface="Calibri Light" panose="020F0302020204030204"/>
+        <a:ea typeface=""/>
+        <a:cs typeface=""/>
+        <a:font script="Jpan" typeface="ＭＳ Ｐゴシック"/>
+        <a:font script="Hang" typeface="맑은 고딕"/>
+        <a:font script="Hans" typeface="宋体"/>
+        <a:font script="Hant" typeface="新細明體"/>
+        <a:font script="Arab" typeface="Times New Roman"/>
+        <a:font script="Hebr" typeface="Times New Roman"/>
+        <a:font script="Thai" typeface="Angsana New"/>
+        <a:font script="Ethi" typeface="Nyala"/>
+        <a:font script="Beng" typeface="Vrinda"/>
+        <a:font script="Gujr" typeface="Shruti"/>
+        <a:font script="Khmr" typeface="MoolBoran"/>
+        <a:font script="Knda" typeface="Tunga"/>
+        <a:font script="Guru" typeface="Raavi"/>
+        <a:font script="Cans" typeface="Euphemia"/>
+        <a:font script="Cher" typeface="Plantagenet Cherokee"/>
+        <a:font script="Yiii" typeface="Microsoft Yi Baiti"/>
+        <a:font script="Tibt" typeface="Microsoft Himalaya"/>
+        <a:font script="Thaa" typeface="MV Boli"/>
+        <a:font script="Deva" typeface="Mangal"/>
+        <a:font script="Telu" typeface="Gautami"/>
+        <a:font script="Taml" typeface="Latha"/>
+        <a:font script="Syrc" typeface="Estrangelo Edessa"/>
+        <a:font script="Orya" typeface="Kalinga"/>
+        <a:font script="Mlym" typeface="Kartika"/>
+        <a:font script="Laoo" typeface="DokChampa"/>
+        <a:font script="Sinh" typeface="Iskoola Pota"/>
+        <a:font script="Mong" typeface="Mongolian Baiti"/>
+        <a:font script="Viet" typeface="Times New Roman"/>
+        <a:font script="Uigh" typeface="Microsoft Uighur"/>
+        <a:font script="Geor" typeface="Sylfaen"/>
+      </a:majorFont>
+      <a:minorFont>
+        <a:latin typeface="Calibri" panose="020F0502020204030204"/>
+        <a:ea typeface=""/>
+        <a:cs typeface=""/>
+        <a:font script="Jpan" typeface="ＭＳ Ｐゴシック"/>
+        <a:font script="Hang" typeface="맑은 고딕"/>
+        <a:font script="Hans" typeface="宋体"/>
+        <a:font script="Hant" typeface="新細明體"/>
+        <a:font script="Arab" typeface="Arial"/>
+        <a:font script="Hebr" typeface="Arial"/>
+        <a:font script="Thai" typeface="Cordia New"/>
+        <a:font script="Ethi" typeface="Nyala"/>
+        <a:font script="Beng" typeface="Vrinda"/>
+        <a:font script="Gujr" typeface="Shruti"/>
+        <a:font script="Khmr" typeface="DaunPenh"/>
+        <a:font script="Knda" typeface="Tunga"/>
+        <a:font script="Guru" typeface="Raavi"/>
+        <a:font script="Cans" typeface="Euphemia"/>
+        <a:font script="Cher" typeface="Plantagenet Cherokee"/>
+        <a:font script="Yiii" typeface="Microsoft Yi Baiti"/>
+        <a:font script="Tibt" typeface="Microsoft Himalaya"/>
+        <a:font script="Thaa" typeface="MV Boli"/>
+        <a:font script="Deva" typeface="Mangal"/>
+        <a:font script="Telu" typeface="Gautami"/>
+        <a:font script="Taml" typeface="Latha"/>
+        <a:font script="Syrc" typeface="Estrangelo Edessa"/>
+        <a:font script="Orya" typeface="Kalinga"/>
+        <a:font script="Mlym" typeface="Kartika"/>
+        <a:font script="Laoo" typeface="DokChampa"/>
+        <a:font script="Sinh" typeface="Iskoola Pota"/>
+        <a:font script="Mong" typeface="Mongolian Baiti"/>
+        <a:font script="Viet" typeface="Arial"/>
+        <a:font script="Uigh" typeface="Microsoft Uighur"/>
+        <a:font script="Geor" typeface="Sylfaen"/>
+      </a:minorFont>
+    </a:fontScheme>
+    <a:fmtScheme name="Office">
+      <a:fillStyleLst>
+        <a:solidFill>
+          <a:schemeClr val="phClr"/>
+        </a:solidFill>
+        <a:gradFill rotWithShape="1">
+          <a:gsLst>
+            <a:gs pos="0">
+              <a:schemeClr val="phClr">
+                <a:lumMod val="110000"/>
+                <a:satMod val="105000"/>
+                <a:tint val="67000"/>
+              </a:schemeClr>
+            </a:gs>
+            <a:gs pos="50000">
+              <a:schemeClr val="phClr">
+                <a:lumMod val="105000"/>
+                <a:satMod val="103000"/>
+                <a:tint val="73000"/>
+              </a:schemeClr>
+            </a:gs>
+            <a:gs pos="100000">
+              <a:schemeClr val="phClr">
+                <a:lumMod val="105000"/>
+                <a:satMod val="109000"/>
+                <a:tint val="81000"/>
+              </a:schemeClr>
+            </a:gs>
+          </a:gsLst>
+          <a:lin ang="5400000" scaled="0"/>
+        </a:gradFill>
+        <a:gradFill rotWithShape="1">
+          <a:gsLst>
+            <a:gs pos="0">
+              <a:schemeClr val="phClr">
+                <a:satMod val="103000"/>
+                <a:lumMod val="102000"/>
+                <a:tint val="94000"/>
+              </a:schemeClr>
+            </a:gs>
+            <a:gs pos="50000">
+              <a:schemeClr val="phClr">
+                <a:satMod val="110000"/>
+                <a:lumMod val="100000"/>
+                <a:shade val="100000"/>
+              </a:schemeClr>
+            </a:gs>
+            <a:gs pos="100000">
+              <a:schemeClr val="phClr">
+                <a:lumMod val="99000"/>
+                <a:satMod val="120000"/>
+                <a:shade val="78000"/>
+              </a:schemeClr>
+            </a:gs>
+          </a:gsLst>
+          <a:lin ang="5400000" scaled="0"/>
+        </a:gradFill>
+      </a:fillStyleLst>
+      <a:lnStyleLst>
+        <a:ln w="6350" cap="flat" cmpd="sng" algn="ctr">
+          <a:solidFill>
+            <a:schemeClr val="phClr"/>
+          </a:solidFill>
+          <a:prstDash val="solid"/>
+          <a:miter lim="800000"/>
+        </a:ln>
+        <a:ln w="12700" cap="flat" cmpd="sng" algn="ctr">
+          <a:solidFill>
+            <a:schemeClr val="phClr"/>
+          </a:solidFill>
+          <a:prstDash val="solid"/>
+          <a:miter lim="800000"/>
+        </a:ln>
+        <a:ln w="19050" cap="flat" cmpd="sng" algn="ctr">
+          <a:solidFill>
+            <a:schemeClr val="phClr"/>
+          </a:solidFill>
+          <a:prstDash val="solid"/>
+          <a:miter lim="800000"/>
+        </a:ln>
+      </a:lnStyleLst>
+      <a:effectStyleLst>
+        <a:effectStyle>
+          <a:effectLst/>
+        </a:effectStyle>
+        <a:effectStyle>
+          <a:effectLst/>
+        </a:effectStyle>
+        <a:effectStyle>
+          <a:effectLst>
+            <a:outerShdw blurRad="57150" dist="19050" dir="5400000" algn="ctr" rotWithShape="0">
+              <a:srgbClr val="000000">
+                <a:alpha val="63000"/>
+              </a:srgbClr>
+            </a:outerShdw>
+          </a:effectLst>
+        </a:effectStyle>
+      </a:effectStyleLst>
+      <a:bgFillStyleLst>
+        <a:solidFill>
+          <a:schemeClr val="phClr"/>
+        </a:solidFill>
+        <a:solidFill>
+          <a:schemeClr val="phClr">
+            <a:tint val="95000"/>
+            <a:satMod val="170000"/>
+          </a:schemeClr>
+        </a:solidFill>
+        <a:gradFill rotWithShape="1">
+          <a:gsLst>
+            <a:gs pos="0">
+              <a:schemeClr val="phClr">
+                <a:tint val="93000"/>
+                <a:satMod val="150000"/>
+                <a:shade val="98000"/>
+                <a:lumMod val="102000"/>
+              </a:schemeClr>
+            </a:gs>
+            <a:gs pos="50000">
+              <a:schemeClr val="phClr">
+                <a:tint val="98000"/>
+                <a:satMod val="130000"/>
+                <a:shade val="90000"/>
+                <a:lumMod val="103000"/>
+              </a:schemeClr>
+            </a:gs>
+            <a:gs pos="100000">
+              <a:schemeClr val="phClr">
+                <a:shade val="63000"/>
+                <a:satMod val="120000"/>
+              </a:schemeClr>
+            </a:gs>
+          </a:gsLst>
+          <a:lin ang="5400000" scaled="0"/>
+        </a:gradFill>
+      </a:bgFillStyleLst>
+    </a:fmtScheme>
+  </a:themeElements>
+  <a:objectDefaults/>
+  <a:extraClrSchemeLst/>
+  <a:extLst>
+    <a:ext uri="{05A4C25C-085E-4340-85A3-A5531E510DB2}">
+      <thm15:themeFamily xmlns:thm15="http://schemas.microsoft.com/office/thememl/2012/main" name="Office Theme" id="{62F939B6-93AF-4DB8-9C6B-D6C7DFDC589F}" vid="{4A3C46E8-61CC-4603-A589-7422A47A8E4A}"/>
+    </a:ext>
+  </a:extLst>
+</a:theme>
 </file>
</xml_diff>